<commit_message>
many docs + small adjustments
</commit_message>
<xml_diff>
--- a/docs/ComponentDocs.pptx
+++ b/docs/ComponentDocs.pptx
@@ -9,6 +9,9 @@
     <p:sldId id="257" r:id="rId3"/>
     <p:sldId id="258" r:id="rId4"/>
     <p:sldId id="259" r:id="rId5"/>
+    <p:sldId id="260" r:id="rId6"/>
+    <p:sldId id="261" r:id="rId7"/>
+    <p:sldId id="262" r:id="rId8"/>
   </p:sldIdLst>
   <p:sldSz cx="12192000" cy="6858000"/>
   <p:notesSz cx="6858000" cy="9144000"/>
@@ -107,6 +110,11 @@
       </a:defRPr>
     </a:lvl9pPr>
   </p:defaultTextStyle>
+  <p:extLst>
+    <p:ext uri="{EFAFB233-063F-42B5-8137-9DF3F51BA10A}">
+      <p15:sldGuideLst xmlns:p15="http://schemas.microsoft.com/office/powerpoint/2012/main"/>
+    </p:ext>
+  </p:extLst>
 </p:presentation>
 </file>
 
@@ -257,7 +265,7 @@
           <a:p>
             <a:fld id="{ACB15FA1-C85B-48BC-AF8B-E9DF226D558D}" type="datetimeFigureOut">
               <a:rPr lang="en-US" smtClean="0"/>
-              <a:t>7/18/2022</a:t>
+              <a:t>8/3/2022</a:t>
             </a:fld>
             <a:endParaRPr lang="en-US"/>
           </a:p>
@@ -455,7 +463,7 @@
           <a:p>
             <a:fld id="{ACB15FA1-C85B-48BC-AF8B-E9DF226D558D}" type="datetimeFigureOut">
               <a:rPr lang="en-US" smtClean="0"/>
-              <a:t>7/18/2022</a:t>
+              <a:t>8/3/2022</a:t>
             </a:fld>
             <a:endParaRPr lang="en-US"/>
           </a:p>
@@ -663,7 +671,7 @@
           <a:p>
             <a:fld id="{ACB15FA1-C85B-48BC-AF8B-E9DF226D558D}" type="datetimeFigureOut">
               <a:rPr lang="en-US" smtClean="0"/>
-              <a:t>7/18/2022</a:t>
+              <a:t>8/3/2022</a:t>
             </a:fld>
             <a:endParaRPr lang="en-US"/>
           </a:p>
@@ -861,7 +869,7 @@
           <a:p>
             <a:fld id="{ACB15FA1-C85B-48BC-AF8B-E9DF226D558D}" type="datetimeFigureOut">
               <a:rPr lang="en-US" smtClean="0"/>
-              <a:t>7/18/2022</a:t>
+              <a:t>8/3/2022</a:t>
             </a:fld>
             <a:endParaRPr lang="en-US"/>
           </a:p>
@@ -1136,7 +1144,7 @@
           <a:p>
             <a:fld id="{ACB15FA1-C85B-48BC-AF8B-E9DF226D558D}" type="datetimeFigureOut">
               <a:rPr lang="en-US" smtClean="0"/>
-              <a:t>7/18/2022</a:t>
+              <a:t>8/3/2022</a:t>
             </a:fld>
             <a:endParaRPr lang="en-US"/>
           </a:p>
@@ -1401,7 +1409,7 @@
           <a:p>
             <a:fld id="{ACB15FA1-C85B-48BC-AF8B-E9DF226D558D}" type="datetimeFigureOut">
               <a:rPr lang="en-US" smtClean="0"/>
-              <a:t>7/18/2022</a:t>
+              <a:t>8/3/2022</a:t>
             </a:fld>
             <a:endParaRPr lang="en-US"/>
           </a:p>
@@ -1813,7 +1821,7 @@
           <a:p>
             <a:fld id="{ACB15FA1-C85B-48BC-AF8B-E9DF226D558D}" type="datetimeFigureOut">
               <a:rPr lang="en-US" smtClean="0"/>
-              <a:t>7/18/2022</a:t>
+              <a:t>8/3/2022</a:t>
             </a:fld>
             <a:endParaRPr lang="en-US"/>
           </a:p>
@@ -1954,7 +1962,7 @@
           <a:p>
             <a:fld id="{ACB15FA1-C85B-48BC-AF8B-E9DF226D558D}" type="datetimeFigureOut">
               <a:rPr lang="en-US" smtClean="0"/>
-              <a:t>7/18/2022</a:t>
+              <a:t>8/3/2022</a:t>
             </a:fld>
             <a:endParaRPr lang="en-US"/>
           </a:p>
@@ -2067,7 +2075,7 @@
           <a:p>
             <a:fld id="{ACB15FA1-C85B-48BC-AF8B-E9DF226D558D}" type="datetimeFigureOut">
               <a:rPr lang="en-US" smtClean="0"/>
-              <a:t>7/18/2022</a:t>
+              <a:t>8/3/2022</a:t>
             </a:fld>
             <a:endParaRPr lang="en-US"/>
           </a:p>
@@ -2378,7 +2386,7 @@
           <a:p>
             <a:fld id="{ACB15FA1-C85B-48BC-AF8B-E9DF226D558D}" type="datetimeFigureOut">
               <a:rPr lang="en-US" smtClean="0"/>
-              <a:t>7/18/2022</a:t>
+              <a:t>8/3/2022</a:t>
             </a:fld>
             <a:endParaRPr lang="en-US"/>
           </a:p>
@@ -2666,7 +2674,7 @@
           <a:p>
             <a:fld id="{ACB15FA1-C85B-48BC-AF8B-E9DF226D558D}" type="datetimeFigureOut">
               <a:rPr lang="en-US" smtClean="0"/>
-              <a:t>7/18/2022</a:t>
+              <a:t>8/3/2022</a:t>
             </a:fld>
             <a:endParaRPr lang="en-US"/>
           </a:p>
@@ -2907,7 +2915,7 @@
           <a:p>
             <a:fld id="{ACB15FA1-C85B-48BC-AF8B-E9DF226D558D}" type="datetimeFigureOut">
               <a:rPr lang="en-US" smtClean="0"/>
-              <a:t>7/18/2022</a:t>
+              <a:t>8/3/2022</a:t>
             </a:fld>
             <a:endParaRPr lang="en-US"/>
           </a:p>
@@ -6600,13 +6608,8 @@
             </a:r>
             <a:r>
               <a:rPr lang="en-US" sz="1200" dirty="0"/>
-              <a:t> </a:t>
-            </a:r>
-            <a:r>
-              <a:rPr lang="en-US" sz="1200"/>
-              <a:t>is “up”.</a:t>
-            </a:r>
-            <a:endParaRPr lang="en-US" sz="1200" dirty="0"/>
+              <a:t> is “up”.</a:t>
+            </a:r>
           </a:p>
         </p:txBody>
       </p:sp>
@@ -8644,6 +8647,2673 @@
     <p:extLst>
       <p:ext uri="{BB962C8B-B14F-4D97-AF65-F5344CB8AC3E}">
         <p14:creationId xmlns:p14="http://schemas.microsoft.com/office/powerpoint/2010/main" val="1432517760"/>
+      </p:ext>
+    </p:extLst>
+  </p:cSld>
+  <p:clrMapOvr>
+    <a:masterClrMapping/>
+  </p:clrMapOvr>
+</p:sld>
+</file>
+
+<file path=ppt/slides/slide5.xml><?xml version="1.0" encoding="utf-8"?>
+<p:sld xmlns:a="http://schemas.openxmlformats.org/drawingml/2006/main" xmlns:r="http://schemas.openxmlformats.org/officeDocument/2006/relationships" xmlns:p="http://schemas.openxmlformats.org/presentationml/2006/main">
+  <p:cSld>
+    <p:spTree>
+      <p:nvGrpSpPr>
+        <p:cNvPr id="1" name=""/>
+        <p:cNvGrpSpPr/>
+        <p:nvPr/>
+      </p:nvGrpSpPr>
+      <p:grpSpPr>
+        <a:xfrm>
+          <a:off x="0" y="0"/>
+          <a:ext cx="0" cy="0"/>
+          <a:chOff x="0" y="0"/>
+          <a:chExt cx="0" cy="0"/>
+        </a:xfrm>
+      </p:grpSpPr>
+      <p:pic>
+        <p:nvPicPr>
+          <p:cNvPr id="30" name="Content Placeholder 29" descr="A picture containing shape&#10;&#10;Description automatically generated">
+            <a:extLst>
+              <a:ext uri="{FF2B5EF4-FFF2-40B4-BE49-F238E27FC236}">
+                <a16:creationId xmlns:a16="http://schemas.microsoft.com/office/drawing/2014/main" id="{8B256120-376D-3371-5F41-7DCD35B22B00}"/>
+              </a:ext>
+            </a:extLst>
+          </p:cNvPr>
+          <p:cNvPicPr>
+            <a:picLocks noGrp="1" noChangeAspect="1"/>
+          </p:cNvPicPr>
+          <p:nvPr>
+            <p:ph idx="1"/>
+          </p:nvPr>
+        </p:nvPicPr>
+        <p:blipFill rotWithShape="1">
+          <a:blip r:embed="rId2">
+            <a:extLst>
+              <a:ext uri="{28A0092B-C50C-407E-A947-70E740481C1C}">
+                <a14:useLocalDpi xmlns:a14="http://schemas.microsoft.com/office/drawing/2010/main" val="0"/>
+              </a:ext>
+            </a:extLst>
+          </a:blip>
+          <a:srcRect l="5510" t="3654" r="8393" b="10211"/>
+          <a:stretch/>
+        </p:blipFill>
+        <p:spPr>
+          <a:xfrm>
+            <a:off x="238125" y="1690687"/>
+            <a:ext cx="10086975" cy="4872037"/>
+          </a:xfrm>
+        </p:spPr>
+      </p:pic>
+      <p:sp>
+        <p:nvSpPr>
+          <p:cNvPr id="2" name="Title 1">
+            <a:extLst>
+              <a:ext uri="{FF2B5EF4-FFF2-40B4-BE49-F238E27FC236}">
+                <a16:creationId xmlns:a16="http://schemas.microsoft.com/office/drawing/2014/main" id="{7B340F4F-2BEB-927C-A4F9-346041A544F5}"/>
+              </a:ext>
+            </a:extLst>
+          </p:cNvPr>
+          <p:cNvSpPr>
+            <a:spLocks noGrp="1"/>
+          </p:cNvSpPr>
+          <p:nvPr>
+            <p:ph type="title"/>
+          </p:nvPr>
+        </p:nvSpPr>
+        <p:spPr/>
+        <p:txBody>
+          <a:bodyPr/>
+          <a:lstStyle/>
+          <a:p>
+            <a:r>
+              <a:rPr lang="en-US" dirty="0" err="1"/>
+              <a:t>QubitNotchFromJunc</a:t>
+            </a:r>
+            <a:endParaRPr lang="en-US" dirty="0"/>
+          </a:p>
+        </p:txBody>
+      </p:sp>
+      <p:cxnSp>
+        <p:nvCxnSpPr>
+          <p:cNvPr id="6" name="Straight Arrow Connector 5">
+            <a:extLst>
+              <a:ext uri="{FF2B5EF4-FFF2-40B4-BE49-F238E27FC236}">
+                <a16:creationId xmlns:a16="http://schemas.microsoft.com/office/drawing/2014/main" id="{6C1EFFDF-EBD7-EB0D-858E-6A9FDCCB7837}"/>
+              </a:ext>
+            </a:extLst>
+          </p:cNvPr>
+          <p:cNvCxnSpPr>
+            <a:cxnSpLocks/>
+          </p:cNvCxnSpPr>
+          <p:nvPr/>
+        </p:nvCxnSpPr>
+        <p:spPr>
+          <a:xfrm>
+            <a:off x="935631" y="2240326"/>
+            <a:ext cx="8897344" cy="0"/>
+          </a:xfrm>
+          <a:prstGeom prst="straightConnector1">
+            <a:avLst/>
+          </a:prstGeom>
+          <a:ln w="19050">
+            <a:solidFill>
+              <a:srgbClr val="FF09A7"/>
+            </a:solidFill>
+            <a:headEnd type="triangle"/>
+            <a:tailEnd type="triangle"/>
+          </a:ln>
+        </p:spPr>
+        <p:style>
+          <a:lnRef idx="1">
+            <a:schemeClr val="accent1"/>
+          </a:lnRef>
+          <a:fillRef idx="0">
+            <a:schemeClr val="accent1"/>
+          </a:fillRef>
+          <a:effectRef idx="0">
+            <a:schemeClr val="accent1"/>
+          </a:effectRef>
+          <a:fontRef idx="minor">
+            <a:schemeClr val="tx1"/>
+          </a:fontRef>
+        </p:style>
+      </p:cxnSp>
+      <p:sp>
+        <p:nvSpPr>
+          <p:cNvPr id="7" name="TextBox 6">
+            <a:extLst>
+              <a:ext uri="{FF2B5EF4-FFF2-40B4-BE49-F238E27FC236}">
+                <a16:creationId xmlns:a16="http://schemas.microsoft.com/office/drawing/2014/main" id="{9D3B21FF-2930-786D-A555-D693875A834B}"/>
+              </a:ext>
+            </a:extLst>
+          </p:cNvPr>
+          <p:cNvSpPr txBox="1"/>
+          <p:nvPr/>
+        </p:nvSpPr>
+        <p:spPr>
+          <a:xfrm>
+            <a:off x="4638217" y="1956978"/>
+            <a:ext cx="1502806" cy="276999"/>
+          </a:xfrm>
+          <a:prstGeom prst="rect">
+            <a:avLst/>
+          </a:prstGeom>
+          <a:noFill/>
+        </p:spPr>
+        <p:txBody>
+          <a:bodyPr wrap="square" rtlCol="0">
+            <a:spAutoFit/>
+          </a:bodyPr>
+          <a:lstStyle/>
+          <a:p>
+            <a:r>
+              <a:rPr lang="en-US" sz="1200" dirty="0">
+                <a:solidFill>
+                  <a:srgbClr val="FF99FF"/>
+                </a:solidFill>
+              </a:rPr>
+              <a:t>length</a:t>
+            </a:r>
+          </a:p>
+        </p:txBody>
+      </p:sp>
+      <p:cxnSp>
+        <p:nvCxnSpPr>
+          <p:cNvPr id="8" name="Straight Connector 7">
+            <a:extLst>
+              <a:ext uri="{FF2B5EF4-FFF2-40B4-BE49-F238E27FC236}">
+                <a16:creationId xmlns:a16="http://schemas.microsoft.com/office/drawing/2014/main" id="{07291C08-A241-A959-FB05-CA872696C60D}"/>
+              </a:ext>
+            </a:extLst>
+          </p:cNvPr>
+          <p:cNvCxnSpPr>
+            <a:cxnSpLocks/>
+          </p:cNvCxnSpPr>
+          <p:nvPr/>
+        </p:nvCxnSpPr>
+        <p:spPr>
+          <a:xfrm>
+            <a:off x="944619" y="2246676"/>
+            <a:ext cx="0" cy="2592197"/>
+          </a:xfrm>
+          <a:prstGeom prst="line">
+            <a:avLst/>
+          </a:prstGeom>
+          <a:ln w="9525">
+            <a:solidFill>
+              <a:srgbClr val="FF09A7"/>
+            </a:solidFill>
+          </a:ln>
+        </p:spPr>
+        <p:style>
+          <a:lnRef idx="1">
+            <a:schemeClr val="accent1"/>
+          </a:lnRef>
+          <a:fillRef idx="0">
+            <a:schemeClr val="accent1"/>
+          </a:fillRef>
+          <a:effectRef idx="0">
+            <a:schemeClr val="accent1"/>
+          </a:effectRef>
+          <a:fontRef idx="minor">
+            <a:schemeClr val="tx1"/>
+          </a:fontRef>
+        </p:style>
+      </p:cxnSp>
+      <p:cxnSp>
+        <p:nvCxnSpPr>
+          <p:cNvPr id="11" name="Straight Connector 10">
+            <a:extLst>
+              <a:ext uri="{FF2B5EF4-FFF2-40B4-BE49-F238E27FC236}">
+                <a16:creationId xmlns:a16="http://schemas.microsoft.com/office/drawing/2014/main" id="{82F91949-BA44-BD35-1C7B-125B3C2335C8}"/>
+              </a:ext>
+            </a:extLst>
+          </p:cNvPr>
+          <p:cNvCxnSpPr>
+            <a:cxnSpLocks/>
+          </p:cNvCxnSpPr>
+          <p:nvPr/>
+        </p:nvCxnSpPr>
+        <p:spPr>
+          <a:xfrm>
+            <a:off x="9834619" y="2240326"/>
+            <a:ext cx="0" cy="2592197"/>
+          </a:xfrm>
+          <a:prstGeom prst="line">
+            <a:avLst/>
+          </a:prstGeom>
+          <a:ln w="9525">
+            <a:solidFill>
+              <a:srgbClr val="FF09A7"/>
+            </a:solidFill>
+          </a:ln>
+        </p:spPr>
+        <p:style>
+          <a:lnRef idx="1">
+            <a:schemeClr val="accent1"/>
+          </a:lnRef>
+          <a:fillRef idx="0">
+            <a:schemeClr val="accent1"/>
+          </a:fillRef>
+          <a:effectRef idx="0">
+            <a:schemeClr val="accent1"/>
+          </a:effectRef>
+          <a:fontRef idx="minor">
+            <a:schemeClr val="tx1"/>
+          </a:fontRef>
+        </p:style>
+      </p:cxnSp>
+      <p:cxnSp>
+        <p:nvCxnSpPr>
+          <p:cNvPr id="13" name="Straight Arrow Connector 12">
+            <a:extLst>
+              <a:ext uri="{FF2B5EF4-FFF2-40B4-BE49-F238E27FC236}">
+                <a16:creationId xmlns:a16="http://schemas.microsoft.com/office/drawing/2014/main" id="{C615B352-CDDC-9633-950B-9B3CFB9B49AC}"/>
+              </a:ext>
+            </a:extLst>
+          </p:cNvPr>
+          <p:cNvCxnSpPr>
+            <a:cxnSpLocks/>
+          </p:cNvCxnSpPr>
+          <p:nvPr/>
+        </p:nvCxnSpPr>
+        <p:spPr>
+          <a:xfrm flipH="1">
+            <a:off x="2841625" y="3054523"/>
+            <a:ext cx="0" cy="1784350"/>
+          </a:xfrm>
+          <a:prstGeom prst="straightConnector1">
+            <a:avLst/>
+          </a:prstGeom>
+          <a:ln w="19050">
+            <a:solidFill>
+              <a:srgbClr val="FF09A7"/>
+            </a:solidFill>
+            <a:headEnd type="triangle"/>
+            <a:tailEnd type="triangle"/>
+          </a:ln>
+        </p:spPr>
+        <p:style>
+          <a:lnRef idx="1">
+            <a:schemeClr val="accent1"/>
+          </a:lnRef>
+          <a:fillRef idx="0">
+            <a:schemeClr val="accent1"/>
+          </a:fillRef>
+          <a:effectRef idx="0">
+            <a:schemeClr val="accent1"/>
+          </a:effectRef>
+          <a:fontRef idx="minor">
+            <a:schemeClr val="tx1"/>
+          </a:fontRef>
+        </p:style>
+      </p:cxnSp>
+      <p:sp>
+        <p:nvSpPr>
+          <p:cNvPr id="19" name="TextBox 18">
+            <a:extLst>
+              <a:ext uri="{FF2B5EF4-FFF2-40B4-BE49-F238E27FC236}">
+                <a16:creationId xmlns:a16="http://schemas.microsoft.com/office/drawing/2014/main" id="{DF1604AE-8CA9-B984-AECB-577B60DAEFAE}"/>
+              </a:ext>
+            </a:extLst>
+          </p:cNvPr>
+          <p:cNvSpPr txBox="1"/>
+          <p:nvPr/>
+        </p:nvSpPr>
+        <p:spPr>
+          <a:xfrm>
+            <a:off x="2841080" y="3795723"/>
+            <a:ext cx="1502806" cy="276999"/>
+          </a:xfrm>
+          <a:prstGeom prst="rect">
+            <a:avLst/>
+          </a:prstGeom>
+          <a:noFill/>
+        </p:spPr>
+        <p:txBody>
+          <a:bodyPr wrap="square" rtlCol="0">
+            <a:spAutoFit/>
+          </a:bodyPr>
+          <a:lstStyle/>
+          <a:p>
+            <a:r>
+              <a:rPr lang="en-US" sz="1200" dirty="0">
+                <a:solidFill>
+                  <a:srgbClr val="FF99FF"/>
+                </a:solidFill>
+              </a:rPr>
+              <a:t>height</a:t>
+            </a:r>
+          </a:p>
+        </p:txBody>
+      </p:sp>
+      <p:sp>
+        <p:nvSpPr>
+          <p:cNvPr id="20" name="Arc 19">
+            <a:extLst>
+              <a:ext uri="{FF2B5EF4-FFF2-40B4-BE49-F238E27FC236}">
+                <a16:creationId xmlns:a16="http://schemas.microsoft.com/office/drawing/2014/main" id="{CCEC82B7-147B-18FC-E7E0-B5FC7BCF14ED}"/>
+              </a:ext>
+            </a:extLst>
+          </p:cNvPr>
+          <p:cNvSpPr/>
+          <p:nvPr/>
+        </p:nvSpPr>
+        <p:spPr>
+          <a:xfrm>
+            <a:off x="478431" y="4375323"/>
+            <a:ext cx="914400" cy="914400"/>
+          </a:xfrm>
+          <a:prstGeom prst="arc">
+            <a:avLst>
+              <a:gd name="adj1" fmla="val 18216814"/>
+              <a:gd name="adj2" fmla="val 0"/>
+            </a:avLst>
+          </a:prstGeom>
+          <a:ln w="9525">
+            <a:solidFill>
+              <a:srgbClr val="FF09A7"/>
+            </a:solidFill>
+          </a:ln>
+        </p:spPr>
+        <p:style>
+          <a:lnRef idx="1">
+            <a:schemeClr val="accent1"/>
+          </a:lnRef>
+          <a:fillRef idx="0">
+            <a:schemeClr val="accent1"/>
+          </a:fillRef>
+          <a:effectRef idx="0">
+            <a:schemeClr val="accent1"/>
+          </a:effectRef>
+          <a:fontRef idx="minor">
+            <a:schemeClr val="tx1"/>
+          </a:fontRef>
+        </p:style>
+        <p:txBody>
+          <a:bodyPr rtlCol="0" anchor="ctr"/>
+          <a:lstStyle/>
+          <a:p>
+            <a:pPr algn="ctr"/>
+            <a:endParaRPr lang="en-US" dirty="0"/>
+          </a:p>
+        </p:txBody>
+      </p:sp>
+      <p:sp>
+        <p:nvSpPr>
+          <p:cNvPr id="21" name="TextBox 20">
+            <a:extLst>
+              <a:ext uri="{FF2B5EF4-FFF2-40B4-BE49-F238E27FC236}">
+                <a16:creationId xmlns:a16="http://schemas.microsoft.com/office/drawing/2014/main" id="{0260FF8E-F99E-0B7C-E011-127815055F77}"/>
+              </a:ext>
+            </a:extLst>
+          </p:cNvPr>
+          <p:cNvSpPr txBox="1"/>
+          <p:nvPr/>
+        </p:nvSpPr>
+        <p:spPr>
+          <a:xfrm>
+            <a:off x="1337997" y="4395545"/>
+            <a:ext cx="1502806" cy="276999"/>
+          </a:xfrm>
+          <a:prstGeom prst="rect">
+            <a:avLst/>
+          </a:prstGeom>
+          <a:noFill/>
+        </p:spPr>
+        <p:txBody>
+          <a:bodyPr wrap="square" rtlCol="0">
+            <a:spAutoFit/>
+          </a:bodyPr>
+          <a:lstStyle/>
+          <a:p>
+            <a:r>
+              <a:rPr lang="en-US" sz="1200" dirty="0" err="1">
+                <a:solidFill>
+                  <a:srgbClr val="FF99FF"/>
+                </a:solidFill>
+              </a:rPr>
+              <a:t>taper_angle</a:t>
+            </a:r>
+            <a:endParaRPr lang="en-US" sz="1200" dirty="0">
+              <a:solidFill>
+                <a:srgbClr val="FF99FF"/>
+              </a:solidFill>
+            </a:endParaRPr>
+          </a:p>
+        </p:txBody>
+      </p:sp>
+      <p:sp>
+        <p:nvSpPr>
+          <p:cNvPr id="22" name="TextBox 21">
+            <a:extLst>
+              <a:ext uri="{FF2B5EF4-FFF2-40B4-BE49-F238E27FC236}">
+                <a16:creationId xmlns:a16="http://schemas.microsoft.com/office/drawing/2014/main" id="{10F239D6-F579-008B-210D-EB69136AE477}"/>
+              </a:ext>
+            </a:extLst>
+          </p:cNvPr>
+          <p:cNvSpPr txBox="1"/>
+          <p:nvPr/>
+        </p:nvSpPr>
+        <p:spPr>
+          <a:xfrm>
+            <a:off x="10439400" y="1800225"/>
+            <a:ext cx="1591764" cy="830997"/>
+          </a:xfrm>
+          <a:prstGeom prst="rect">
+            <a:avLst/>
+          </a:prstGeom>
+          <a:noFill/>
+        </p:spPr>
+        <p:txBody>
+          <a:bodyPr wrap="square" rtlCol="0">
+            <a:spAutoFit/>
+          </a:bodyPr>
+          <a:lstStyle/>
+          <a:p>
+            <a:r>
+              <a:rPr lang="en-US" sz="1200" dirty="0"/>
+              <a:t>Notes:</a:t>
+            </a:r>
+          </a:p>
+          <a:p>
+            <a:r>
+              <a:rPr lang="en-US" sz="1200" dirty="0"/>
+              <a:t>- The qubit notch shown has ‘</a:t>
+            </a:r>
+            <a:r>
+              <a:rPr lang="en-US" sz="1200" dirty="0" err="1"/>
+              <a:t>leftright</a:t>
+            </a:r>
+            <a:r>
+              <a:rPr lang="en-US" sz="1200" dirty="0"/>
+              <a:t>’ = ‘right’</a:t>
+            </a:r>
+          </a:p>
+        </p:txBody>
+      </p:sp>
+      <p:grpSp>
+        <p:nvGrpSpPr>
+          <p:cNvPr id="23" name="Group 22">
+            <a:extLst>
+              <a:ext uri="{FF2B5EF4-FFF2-40B4-BE49-F238E27FC236}">
+                <a16:creationId xmlns:a16="http://schemas.microsoft.com/office/drawing/2014/main" id="{E275B400-82B7-4516-0021-C0830CC391D8}"/>
+              </a:ext>
+            </a:extLst>
+          </p:cNvPr>
+          <p:cNvGrpSpPr/>
+          <p:nvPr/>
+        </p:nvGrpSpPr>
+        <p:grpSpPr>
+          <a:xfrm rot="16200000">
+            <a:off x="493538" y="5053231"/>
+            <a:ext cx="119919" cy="223398"/>
+            <a:chOff x="-501565" y="761326"/>
+            <a:chExt cx="621484" cy="1157769"/>
+          </a:xfrm>
+          <a:solidFill>
+            <a:srgbClr val="00FFFF"/>
+          </a:solidFill>
+        </p:grpSpPr>
+        <p:sp>
+          <p:nvSpPr>
+            <p:cNvPr id="24" name="Arrow: Up 23">
+              <a:extLst>
+                <a:ext uri="{FF2B5EF4-FFF2-40B4-BE49-F238E27FC236}">
+                  <a16:creationId xmlns:a16="http://schemas.microsoft.com/office/drawing/2014/main" id="{F9B03E20-D2FF-FE89-877C-0554F0FD7562}"/>
+                </a:ext>
+              </a:extLst>
+            </p:cNvPr>
+            <p:cNvSpPr/>
+            <p:nvPr/>
+          </p:nvSpPr>
+          <p:spPr>
+            <a:xfrm>
+              <a:off x="-433139" y="761326"/>
+              <a:ext cx="484632" cy="978408"/>
+            </a:xfrm>
+            <a:prstGeom prst="upArrow">
+              <a:avLst>
+                <a:gd name="adj1" fmla="val 29228"/>
+                <a:gd name="adj2" fmla="val 51731"/>
+              </a:avLst>
+            </a:prstGeom>
+            <a:grpFill/>
+            <a:ln>
+              <a:noFill/>
+            </a:ln>
+          </p:spPr>
+          <p:style>
+            <a:lnRef idx="2">
+              <a:schemeClr val="accent1">
+                <a:shade val="50000"/>
+              </a:schemeClr>
+            </a:lnRef>
+            <a:fillRef idx="1">
+              <a:schemeClr val="accent1"/>
+            </a:fillRef>
+            <a:effectRef idx="0">
+              <a:schemeClr val="accent1"/>
+            </a:effectRef>
+            <a:fontRef idx="minor">
+              <a:schemeClr val="lt1"/>
+            </a:fontRef>
+          </p:style>
+          <p:txBody>
+            <a:bodyPr rtlCol="0" anchor="ctr"/>
+            <a:lstStyle/>
+            <a:p>
+              <a:pPr algn="ctr"/>
+              <a:endParaRPr lang="en-US"/>
+            </a:p>
+          </p:txBody>
+        </p:sp>
+        <p:sp>
+          <p:nvSpPr>
+            <p:cNvPr id="25" name="Oval 24">
+              <a:extLst>
+                <a:ext uri="{FF2B5EF4-FFF2-40B4-BE49-F238E27FC236}">
+                  <a16:creationId xmlns:a16="http://schemas.microsoft.com/office/drawing/2014/main" id="{6D1E4656-E706-6799-70F0-DE72E442EDCF}"/>
+                </a:ext>
+              </a:extLst>
+            </p:cNvPr>
+            <p:cNvSpPr/>
+            <p:nvPr/>
+          </p:nvSpPr>
+          <p:spPr>
+            <a:xfrm>
+              <a:off x="-501565" y="1297611"/>
+              <a:ext cx="621484" cy="621484"/>
+            </a:xfrm>
+            <a:prstGeom prst="ellipse">
+              <a:avLst/>
+            </a:prstGeom>
+            <a:grpFill/>
+            <a:ln>
+              <a:noFill/>
+            </a:ln>
+          </p:spPr>
+          <p:style>
+            <a:lnRef idx="2">
+              <a:schemeClr val="accent1">
+                <a:shade val="50000"/>
+              </a:schemeClr>
+            </a:lnRef>
+            <a:fillRef idx="1">
+              <a:schemeClr val="accent1"/>
+            </a:fillRef>
+            <a:effectRef idx="0">
+              <a:schemeClr val="accent1"/>
+            </a:effectRef>
+            <a:fontRef idx="minor">
+              <a:schemeClr val="lt1"/>
+            </a:fontRef>
+          </p:style>
+          <p:txBody>
+            <a:bodyPr rtlCol="0" anchor="ctr"/>
+            <a:lstStyle/>
+            <a:p>
+              <a:pPr algn="ctr"/>
+              <a:endParaRPr lang="en-US"/>
+            </a:p>
+          </p:txBody>
+        </p:sp>
+      </p:grpSp>
+      <p:sp>
+        <p:nvSpPr>
+          <p:cNvPr id="26" name="TextBox 25">
+            <a:extLst>
+              <a:ext uri="{FF2B5EF4-FFF2-40B4-BE49-F238E27FC236}">
+                <a16:creationId xmlns:a16="http://schemas.microsoft.com/office/drawing/2014/main" id="{ABE1E625-33C1-6AB8-706D-3B3B732B7476}"/>
+              </a:ext>
+            </a:extLst>
+          </p:cNvPr>
+          <p:cNvSpPr txBox="1"/>
+          <p:nvPr/>
+        </p:nvSpPr>
+        <p:spPr>
+          <a:xfrm>
+            <a:off x="630588" y="5017837"/>
+            <a:ext cx="2400575" cy="276999"/>
+          </a:xfrm>
+          <a:prstGeom prst="rect">
+            <a:avLst/>
+          </a:prstGeom>
+          <a:noFill/>
+        </p:spPr>
+        <p:txBody>
+          <a:bodyPr wrap="square" rtlCol="0">
+            <a:spAutoFit/>
+          </a:bodyPr>
+          <a:lstStyle/>
+          <a:p>
+            <a:r>
+              <a:rPr lang="en-US" sz="1200" dirty="0" err="1">
+                <a:solidFill>
+                  <a:srgbClr val="CCFFFF"/>
+                </a:solidFill>
+              </a:rPr>
+              <a:t>refjunc</a:t>
+            </a:r>
+            <a:endParaRPr lang="en-US" sz="1200" dirty="0">
+              <a:solidFill>
+                <a:srgbClr val="CCFFFF"/>
+              </a:solidFill>
+            </a:endParaRPr>
+          </a:p>
+        </p:txBody>
+      </p:sp>
+      <p:cxnSp>
+        <p:nvCxnSpPr>
+          <p:cNvPr id="31" name="Straight Connector 30">
+            <a:extLst>
+              <a:ext uri="{FF2B5EF4-FFF2-40B4-BE49-F238E27FC236}">
+                <a16:creationId xmlns:a16="http://schemas.microsoft.com/office/drawing/2014/main" id="{F9D7DE14-0EDC-5B90-C7A6-5ACE3E668BC4}"/>
+              </a:ext>
+            </a:extLst>
+          </p:cNvPr>
+          <p:cNvCxnSpPr>
+            <a:cxnSpLocks/>
+          </p:cNvCxnSpPr>
+          <p:nvPr/>
+        </p:nvCxnSpPr>
+        <p:spPr>
+          <a:xfrm>
+            <a:off x="611244" y="2246676"/>
+            <a:ext cx="0" cy="2592197"/>
+          </a:xfrm>
+          <a:prstGeom prst="line">
+            <a:avLst/>
+          </a:prstGeom>
+          <a:ln w="9525">
+            <a:solidFill>
+              <a:srgbClr val="FF09A7"/>
+            </a:solidFill>
+          </a:ln>
+        </p:spPr>
+        <p:style>
+          <a:lnRef idx="1">
+            <a:schemeClr val="accent1"/>
+          </a:lnRef>
+          <a:fillRef idx="0">
+            <a:schemeClr val="accent1"/>
+          </a:fillRef>
+          <a:effectRef idx="0">
+            <a:schemeClr val="accent1"/>
+          </a:effectRef>
+          <a:fontRef idx="minor">
+            <a:schemeClr val="tx1"/>
+          </a:fontRef>
+        </p:style>
+      </p:cxnSp>
+      <p:cxnSp>
+        <p:nvCxnSpPr>
+          <p:cNvPr id="34" name="Straight Arrow Connector 33">
+            <a:extLst>
+              <a:ext uri="{FF2B5EF4-FFF2-40B4-BE49-F238E27FC236}">
+                <a16:creationId xmlns:a16="http://schemas.microsoft.com/office/drawing/2014/main" id="{927996CF-A35F-5821-C478-3B8C646D95FA}"/>
+              </a:ext>
+            </a:extLst>
+          </p:cNvPr>
+          <p:cNvCxnSpPr>
+            <a:cxnSpLocks/>
+          </p:cNvCxnSpPr>
+          <p:nvPr/>
+        </p:nvCxnSpPr>
+        <p:spPr>
+          <a:xfrm>
+            <a:off x="601720" y="2240327"/>
+            <a:ext cx="342899" cy="0"/>
+          </a:xfrm>
+          <a:prstGeom prst="straightConnector1">
+            <a:avLst/>
+          </a:prstGeom>
+          <a:ln w="19050">
+            <a:solidFill>
+              <a:srgbClr val="FF09A7"/>
+            </a:solidFill>
+            <a:headEnd type="triangle"/>
+            <a:tailEnd type="triangle"/>
+          </a:ln>
+        </p:spPr>
+        <p:style>
+          <a:lnRef idx="1">
+            <a:schemeClr val="accent1"/>
+          </a:lnRef>
+          <a:fillRef idx="0">
+            <a:schemeClr val="accent1"/>
+          </a:fillRef>
+          <a:effectRef idx="0">
+            <a:schemeClr val="accent1"/>
+          </a:effectRef>
+          <a:fontRef idx="minor">
+            <a:schemeClr val="tx1"/>
+          </a:fontRef>
+        </p:style>
+      </p:cxnSp>
+      <p:sp>
+        <p:nvSpPr>
+          <p:cNvPr id="40" name="TextBox 39">
+            <a:extLst>
+              <a:ext uri="{FF2B5EF4-FFF2-40B4-BE49-F238E27FC236}">
+                <a16:creationId xmlns:a16="http://schemas.microsoft.com/office/drawing/2014/main" id="{04A10C96-F2F7-A55A-3D01-C110C694F0E6}"/>
+              </a:ext>
+            </a:extLst>
+          </p:cNvPr>
+          <p:cNvSpPr txBox="1"/>
+          <p:nvPr/>
+        </p:nvSpPr>
+        <p:spPr>
+          <a:xfrm>
+            <a:off x="478431" y="1946765"/>
+            <a:ext cx="1502806" cy="276999"/>
+          </a:xfrm>
+          <a:prstGeom prst="rect">
+            <a:avLst/>
+          </a:prstGeom>
+          <a:noFill/>
+        </p:spPr>
+        <p:txBody>
+          <a:bodyPr wrap="square" rtlCol="0">
+            <a:spAutoFit/>
+          </a:bodyPr>
+          <a:lstStyle/>
+          <a:p>
+            <a:r>
+              <a:rPr lang="en-US" sz="1200" dirty="0">
+                <a:solidFill>
+                  <a:srgbClr val="FF99FF"/>
+                </a:solidFill>
+              </a:rPr>
+              <a:t>offset</a:t>
+            </a:r>
+          </a:p>
+        </p:txBody>
+      </p:sp>
+    </p:spTree>
+    <p:extLst>
+      <p:ext uri="{BB962C8B-B14F-4D97-AF65-F5344CB8AC3E}">
+        <p14:creationId xmlns:p14="http://schemas.microsoft.com/office/powerpoint/2010/main" val="1563457293"/>
+      </p:ext>
+    </p:extLst>
+  </p:cSld>
+  <p:clrMapOvr>
+    <a:masterClrMapping/>
+  </p:clrMapOvr>
+</p:sld>
+</file>
+
+<file path=ppt/slides/slide6.xml><?xml version="1.0" encoding="utf-8"?>
+<p:sld xmlns:a="http://schemas.openxmlformats.org/drawingml/2006/main" xmlns:r="http://schemas.openxmlformats.org/officeDocument/2006/relationships" xmlns:p="http://schemas.openxmlformats.org/presentationml/2006/main">
+  <p:cSld>
+    <p:spTree>
+      <p:nvGrpSpPr>
+        <p:cNvPr id="1" name=""/>
+        <p:cNvGrpSpPr/>
+        <p:nvPr/>
+      </p:nvGrpSpPr>
+      <p:grpSpPr>
+        <a:xfrm>
+          <a:off x="0" y="0"/>
+          <a:ext cx="0" cy="0"/>
+          <a:chOff x="0" y="0"/>
+          <a:chExt cx="0" cy="0"/>
+        </a:xfrm>
+      </p:grpSpPr>
+      <p:sp>
+        <p:nvSpPr>
+          <p:cNvPr id="2" name="Title 1">
+            <a:extLst>
+              <a:ext uri="{FF2B5EF4-FFF2-40B4-BE49-F238E27FC236}">
+                <a16:creationId xmlns:a16="http://schemas.microsoft.com/office/drawing/2014/main" id="{71B7646F-BD1B-E503-5535-D2313E2A5D99}"/>
+              </a:ext>
+            </a:extLst>
+          </p:cNvPr>
+          <p:cNvSpPr>
+            <a:spLocks noGrp="1"/>
+          </p:cNvSpPr>
+          <p:nvPr>
+            <p:ph type="title"/>
+          </p:nvPr>
+        </p:nvSpPr>
+        <p:spPr/>
+        <p:txBody>
+          <a:bodyPr/>
+          <a:lstStyle/>
+          <a:p>
+            <a:r>
+              <a:rPr lang="en-US" dirty="0" err="1"/>
+              <a:t>SawtoothQubit</a:t>
+            </a:r>
+            <a:r>
+              <a:rPr lang="en-US" dirty="0"/>
+              <a:t> - 1</a:t>
+            </a:r>
+          </a:p>
+        </p:txBody>
+      </p:sp>
+      <p:pic>
+        <p:nvPicPr>
+          <p:cNvPr id="5" name="Content Placeholder 4" descr="Graphical user interface, text, application&#10;&#10;Description automatically generated">
+            <a:extLst>
+              <a:ext uri="{FF2B5EF4-FFF2-40B4-BE49-F238E27FC236}">
+                <a16:creationId xmlns:a16="http://schemas.microsoft.com/office/drawing/2014/main" id="{FE3E7668-B73C-BAB6-EE75-203585203074}"/>
+              </a:ext>
+            </a:extLst>
+          </p:cNvPr>
+          <p:cNvPicPr>
+            <a:picLocks noGrp="1" noChangeAspect="1"/>
+          </p:cNvPicPr>
+          <p:nvPr>
+            <p:ph idx="1"/>
+          </p:nvPr>
+        </p:nvPicPr>
+        <p:blipFill rotWithShape="1">
+          <a:blip r:embed="rId2">
+            <a:extLst>
+              <a:ext uri="{28A0092B-C50C-407E-A947-70E740481C1C}">
+                <a14:useLocalDpi xmlns:a14="http://schemas.microsoft.com/office/drawing/2010/main" val="0"/>
+              </a:ext>
+            </a:extLst>
+          </a:blip>
+          <a:srcRect t="-7224" r="4913" b="-14162"/>
+          <a:stretch/>
+        </p:blipFill>
+        <p:spPr>
+          <a:xfrm>
+            <a:off x="105154" y="1548075"/>
+            <a:ext cx="10515600" cy="5146675"/>
+          </a:xfrm>
+        </p:spPr>
+      </p:pic>
+      <p:cxnSp>
+        <p:nvCxnSpPr>
+          <p:cNvPr id="8" name="Straight Arrow Connector 7">
+            <a:extLst>
+              <a:ext uri="{FF2B5EF4-FFF2-40B4-BE49-F238E27FC236}">
+                <a16:creationId xmlns:a16="http://schemas.microsoft.com/office/drawing/2014/main" id="{D877A87E-56E6-C2AB-DBB5-24478651BD67}"/>
+              </a:ext>
+            </a:extLst>
+          </p:cNvPr>
+          <p:cNvCxnSpPr>
+            <a:cxnSpLocks/>
+          </p:cNvCxnSpPr>
+          <p:nvPr/>
+        </p:nvCxnSpPr>
+        <p:spPr>
+          <a:xfrm>
+            <a:off x="1346692" y="2340993"/>
+            <a:ext cx="8449711" cy="0"/>
+          </a:xfrm>
+          <a:prstGeom prst="straightConnector1">
+            <a:avLst/>
+          </a:prstGeom>
+          <a:ln w="19050">
+            <a:solidFill>
+              <a:srgbClr val="FF09A7"/>
+            </a:solidFill>
+            <a:headEnd type="triangle"/>
+            <a:tailEnd type="triangle"/>
+          </a:ln>
+        </p:spPr>
+        <p:style>
+          <a:lnRef idx="1">
+            <a:schemeClr val="accent1"/>
+          </a:lnRef>
+          <a:fillRef idx="0">
+            <a:schemeClr val="accent1"/>
+          </a:fillRef>
+          <a:effectRef idx="0">
+            <a:schemeClr val="accent1"/>
+          </a:effectRef>
+          <a:fontRef idx="minor">
+            <a:schemeClr val="tx1"/>
+          </a:fontRef>
+        </p:style>
+      </p:cxnSp>
+      <p:sp>
+        <p:nvSpPr>
+          <p:cNvPr id="9" name="TextBox 8">
+            <a:extLst>
+              <a:ext uri="{FF2B5EF4-FFF2-40B4-BE49-F238E27FC236}">
+                <a16:creationId xmlns:a16="http://schemas.microsoft.com/office/drawing/2014/main" id="{9148EA71-E7D8-29B5-390A-14BC44E2E48C}"/>
+              </a:ext>
+            </a:extLst>
+          </p:cNvPr>
+          <p:cNvSpPr txBox="1"/>
+          <p:nvPr/>
+        </p:nvSpPr>
+        <p:spPr>
+          <a:xfrm>
+            <a:off x="5049278" y="2057645"/>
+            <a:ext cx="1502806" cy="276999"/>
+          </a:xfrm>
+          <a:prstGeom prst="rect">
+            <a:avLst/>
+          </a:prstGeom>
+          <a:noFill/>
+        </p:spPr>
+        <p:txBody>
+          <a:bodyPr wrap="square" rtlCol="0">
+            <a:spAutoFit/>
+          </a:bodyPr>
+          <a:lstStyle/>
+          <a:p>
+            <a:r>
+              <a:rPr lang="en-US" sz="1200" dirty="0" err="1">
+                <a:solidFill>
+                  <a:srgbClr val="FF99FF"/>
+                </a:solidFill>
+              </a:rPr>
+              <a:t>paddle_length</a:t>
+            </a:r>
+            <a:endParaRPr lang="en-US" sz="1200" dirty="0">
+              <a:solidFill>
+                <a:srgbClr val="FF99FF"/>
+              </a:solidFill>
+            </a:endParaRPr>
+          </a:p>
+        </p:txBody>
+      </p:sp>
+      <p:cxnSp>
+        <p:nvCxnSpPr>
+          <p:cNvPr id="10" name="Straight Connector 9">
+            <a:extLst>
+              <a:ext uri="{FF2B5EF4-FFF2-40B4-BE49-F238E27FC236}">
+                <a16:creationId xmlns:a16="http://schemas.microsoft.com/office/drawing/2014/main" id="{82F4A772-C0CC-9AE3-2D90-7186F06EFF0D}"/>
+              </a:ext>
+            </a:extLst>
+          </p:cNvPr>
+          <p:cNvCxnSpPr>
+            <a:cxnSpLocks/>
+          </p:cNvCxnSpPr>
+          <p:nvPr/>
+        </p:nvCxnSpPr>
+        <p:spPr>
+          <a:xfrm>
+            <a:off x="1355680" y="2347343"/>
+            <a:ext cx="0" cy="1217978"/>
+          </a:xfrm>
+          <a:prstGeom prst="line">
+            <a:avLst/>
+          </a:prstGeom>
+          <a:ln w="9525">
+            <a:solidFill>
+              <a:srgbClr val="FF09A7"/>
+            </a:solidFill>
+          </a:ln>
+        </p:spPr>
+        <p:style>
+          <a:lnRef idx="1">
+            <a:schemeClr val="accent1"/>
+          </a:lnRef>
+          <a:fillRef idx="0">
+            <a:schemeClr val="accent1"/>
+          </a:fillRef>
+          <a:effectRef idx="0">
+            <a:schemeClr val="accent1"/>
+          </a:effectRef>
+          <a:fontRef idx="minor">
+            <a:schemeClr val="tx1"/>
+          </a:fontRef>
+        </p:style>
+      </p:cxnSp>
+      <p:cxnSp>
+        <p:nvCxnSpPr>
+          <p:cNvPr id="19" name="Straight Connector 18">
+            <a:extLst>
+              <a:ext uri="{FF2B5EF4-FFF2-40B4-BE49-F238E27FC236}">
+                <a16:creationId xmlns:a16="http://schemas.microsoft.com/office/drawing/2014/main" id="{F14EEE6A-9340-3E57-575F-C7F7DE679C91}"/>
+              </a:ext>
+            </a:extLst>
+          </p:cNvPr>
+          <p:cNvCxnSpPr>
+            <a:cxnSpLocks/>
+          </p:cNvCxnSpPr>
+          <p:nvPr/>
+        </p:nvCxnSpPr>
+        <p:spPr>
+          <a:xfrm>
+            <a:off x="9798785" y="2336006"/>
+            <a:ext cx="0" cy="1211853"/>
+          </a:xfrm>
+          <a:prstGeom prst="line">
+            <a:avLst/>
+          </a:prstGeom>
+          <a:ln w="9525">
+            <a:solidFill>
+              <a:srgbClr val="FF09A7"/>
+            </a:solidFill>
+          </a:ln>
+        </p:spPr>
+        <p:style>
+          <a:lnRef idx="1">
+            <a:schemeClr val="accent1"/>
+          </a:lnRef>
+          <a:fillRef idx="0">
+            <a:schemeClr val="accent1"/>
+          </a:fillRef>
+          <a:effectRef idx="0">
+            <a:schemeClr val="accent1"/>
+          </a:effectRef>
+          <a:fontRef idx="minor">
+            <a:schemeClr val="tx1"/>
+          </a:fontRef>
+        </p:style>
+      </p:cxnSp>
+      <p:sp>
+        <p:nvSpPr>
+          <p:cNvPr id="21" name="TextBox 20">
+            <a:extLst>
+              <a:ext uri="{FF2B5EF4-FFF2-40B4-BE49-F238E27FC236}">
+                <a16:creationId xmlns:a16="http://schemas.microsoft.com/office/drawing/2014/main" id="{6ED0E83B-BCD8-660C-F1F9-FA4010896332}"/>
+              </a:ext>
+            </a:extLst>
+          </p:cNvPr>
+          <p:cNvSpPr txBox="1"/>
+          <p:nvPr/>
+        </p:nvSpPr>
+        <p:spPr>
+          <a:xfrm>
+            <a:off x="10710180" y="1872979"/>
+            <a:ext cx="1376666" cy="830997"/>
+          </a:xfrm>
+          <a:prstGeom prst="rect">
+            <a:avLst/>
+          </a:prstGeom>
+          <a:noFill/>
+        </p:spPr>
+        <p:txBody>
+          <a:bodyPr wrap="square" rtlCol="0">
+            <a:spAutoFit/>
+          </a:bodyPr>
+          <a:lstStyle/>
+          <a:p>
+            <a:r>
+              <a:rPr lang="en-US" sz="1200" dirty="0"/>
+              <a:t>Notes:</a:t>
+            </a:r>
+          </a:p>
+          <a:p>
+            <a:pPr marL="171450" indent="-171450">
+              <a:buFontTx/>
+              <a:buChar char="-"/>
+            </a:pPr>
+            <a:r>
+              <a:rPr lang="en-US" sz="1200" dirty="0"/>
+              <a:t>The qubit drawn has ‘</a:t>
+            </a:r>
+            <a:r>
+              <a:rPr lang="en-US" sz="1200" dirty="0" err="1"/>
+              <a:t>updown</a:t>
+            </a:r>
+            <a:r>
+              <a:rPr lang="en-US" sz="1200" dirty="0"/>
+              <a:t>’: ‘up’</a:t>
+            </a:r>
+          </a:p>
+        </p:txBody>
+      </p:sp>
+      <p:cxnSp>
+        <p:nvCxnSpPr>
+          <p:cNvPr id="22" name="Straight Connector 21">
+            <a:extLst>
+              <a:ext uri="{FF2B5EF4-FFF2-40B4-BE49-F238E27FC236}">
+                <a16:creationId xmlns:a16="http://schemas.microsoft.com/office/drawing/2014/main" id="{DFF6FF88-3CED-5904-A96A-2E2A8B223D55}"/>
+              </a:ext>
+            </a:extLst>
+          </p:cNvPr>
+          <p:cNvCxnSpPr>
+            <a:cxnSpLocks/>
+          </p:cNvCxnSpPr>
+          <p:nvPr/>
+        </p:nvCxnSpPr>
+        <p:spPr>
+          <a:xfrm>
+            <a:off x="1206077" y="2340528"/>
+            <a:ext cx="0" cy="1056327"/>
+          </a:xfrm>
+          <a:prstGeom prst="line">
+            <a:avLst/>
+          </a:prstGeom>
+          <a:ln w="9525">
+            <a:solidFill>
+              <a:srgbClr val="FF09A7"/>
+            </a:solidFill>
+          </a:ln>
+        </p:spPr>
+        <p:style>
+          <a:lnRef idx="1">
+            <a:schemeClr val="accent1"/>
+          </a:lnRef>
+          <a:fillRef idx="0">
+            <a:schemeClr val="accent1"/>
+          </a:fillRef>
+          <a:effectRef idx="0">
+            <a:schemeClr val="accent1"/>
+          </a:effectRef>
+          <a:fontRef idx="minor">
+            <a:schemeClr val="tx1"/>
+          </a:fontRef>
+        </p:style>
+      </p:cxnSp>
+      <p:cxnSp>
+        <p:nvCxnSpPr>
+          <p:cNvPr id="25" name="Straight Arrow Connector 24">
+            <a:extLst>
+              <a:ext uri="{FF2B5EF4-FFF2-40B4-BE49-F238E27FC236}">
+                <a16:creationId xmlns:a16="http://schemas.microsoft.com/office/drawing/2014/main" id="{AF9C5BFE-C91C-3A88-0C90-19D902028E69}"/>
+              </a:ext>
+            </a:extLst>
+          </p:cNvPr>
+          <p:cNvCxnSpPr>
+            <a:cxnSpLocks/>
+          </p:cNvCxnSpPr>
+          <p:nvPr/>
+        </p:nvCxnSpPr>
+        <p:spPr>
+          <a:xfrm>
+            <a:off x="1203325" y="2338546"/>
+            <a:ext cx="163642" cy="0"/>
+          </a:xfrm>
+          <a:prstGeom prst="straightConnector1">
+            <a:avLst/>
+          </a:prstGeom>
+          <a:ln w="19050">
+            <a:solidFill>
+              <a:srgbClr val="FF09A7"/>
+            </a:solidFill>
+            <a:headEnd type="triangle"/>
+            <a:tailEnd type="triangle"/>
+          </a:ln>
+        </p:spPr>
+        <p:style>
+          <a:lnRef idx="1">
+            <a:schemeClr val="accent1"/>
+          </a:lnRef>
+          <a:fillRef idx="0">
+            <a:schemeClr val="accent1"/>
+          </a:fillRef>
+          <a:effectRef idx="0">
+            <a:schemeClr val="accent1"/>
+          </a:effectRef>
+          <a:fontRef idx="minor">
+            <a:schemeClr val="tx1"/>
+          </a:fontRef>
+        </p:style>
+      </p:cxnSp>
+      <p:sp>
+        <p:nvSpPr>
+          <p:cNvPr id="28" name="TextBox 27">
+            <a:extLst>
+              <a:ext uri="{FF2B5EF4-FFF2-40B4-BE49-F238E27FC236}">
+                <a16:creationId xmlns:a16="http://schemas.microsoft.com/office/drawing/2014/main" id="{7E98035C-FCB3-BB75-19E7-39116510629B}"/>
+              </a:ext>
+            </a:extLst>
+          </p:cNvPr>
+          <p:cNvSpPr txBox="1"/>
+          <p:nvPr/>
+        </p:nvSpPr>
+        <p:spPr>
+          <a:xfrm>
+            <a:off x="793342" y="2011478"/>
+            <a:ext cx="1502806" cy="276999"/>
+          </a:xfrm>
+          <a:prstGeom prst="rect">
+            <a:avLst/>
+          </a:prstGeom>
+          <a:noFill/>
+        </p:spPr>
+        <p:txBody>
+          <a:bodyPr wrap="square" rtlCol="0">
+            <a:spAutoFit/>
+          </a:bodyPr>
+          <a:lstStyle/>
+          <a:p>
+            <a:r>
+              <a:rPr lang="en-US" sz="1200" dirty="0" err="1">
+                <a:solidFill>
+                  <a:srgbClr val="FF99FF"/>
+                </a:solidFill>
+              </a:rPr>
+              <a:t>h_padding</a:t>
+            </a:r>
+            <a:endParaRPr lang="en-US" sz="1200" dirty="0">
+              <a:solidFill>
+                <a:srgbClr val="FF99FF"/>
+              </a:solidFill>
+            </a:endParaRPr>
+          </a:p>
+        </p:txBody>
+      </p:sp>
+      <p:cxnSp>
+        <p:nvCxnSpPr>
+          <p:cNvPr id="29" name="Straight Connector 28">
+            <a:extLst>
+              <a:ext uri="{FF2B5EF4-FFF2-40B4-BE49-F238E27FC236}">
+                <a16:creationId xmlns:a16="http://schemas.microsoft.com/office/drawing/2014/main" id="{3B51A5D6-E4F0-6F15-BF68-AEC333CF4069}"/>
+              </a:ext>
+            </a:extLst>
+          </p:cNvPr>
+          <p:cNvCxnSpPr>
+            <a:cxnSpLocks/>
+          </p:cNvCxnSpPr>
+          <p:nvPr/>
+        </p:nvCxnSpPr>
+        <p:spPr>
+          <a:xfrm>
+            <a:off x="342210" y="3398557"/>
+            <a:ext cx="861115" cy="0"/>
+          </a:xfrm>
+          <a:prstGeom prst="line">
+            <a:avLst/>
+          </a:prstGeom>
+          <a:ln w="9525">
+            <a:solidFill>
+              <a:srgbClr val="FF09A7"/>
+            </a:solidFill>
+          </a:ln>
+        </p:spPr>
+        <p:style>
+          <a:lnRef idx="1">
+            <a:schemeClr val="accent1"/>
+          </a:lnRef>
+          <a:fillRef idx="0">
+            <a:schemeClr val="accent1"/>
+          </a:fillRef>
+          <a:effectRef idx="0">
+            <a:schemeClr val="accent1"/>
+          </a:effectRef>
+          <a:fontRef idx="minor">
+            <a:schemeClr val="tx1"/>
+          </a:fontRef>
+        </p:style>
+      </p:cxnSp>
+      <p:cxnSp>
+        <p:nvCxnSpPr>
+          <p:cNvPr id="32" name="Straight Connector 31">
+            <a:extLst>
+              <a:ext uri="{FF2B5EF4-FFF2-40B4-BE49-F238E27FC236}">
+                <a16:creationId xmlns:a16="http://schemas.microsoft.com/office/drawing/2014/main" id="{B12CCC50-59CA-2880-36B9-DECD07855358}"/>
+              </a:ext>
+            </a:extLst>
+          </p:cNvPr>
+          <p:cNvCxnSpPr>
+            <a:cxnSpLocks/>
+          </p:cNvCxnSpPr>
+          <p:nvPr/>
+        </p:nvCxnSpPr>
+        <p:spPr>
+          <a:xfrm>
+            <a:off x="342210" y="3547859"/>
+            <a:ext cx="1014007" cy="0"/>
+          </a:xfrm>
+          <a:prstGeom prst="line">
+            <a:avLst/>
+          </a:prstGeom>
+          <a:ln w="9525">
+            <a:solidFill>
+              <a:srgbClr val="FF09A7"/>
+            </a:solidFill>
+          </a:ln>
+        </p:spPr>
+        <p:style>
+          <a:lnRef idx="1">
+            <a:schemeClr val="accent1"/>
+          </a:lnRef>
+          <a:fillRef idx="0">
+            <a:schemeClr val="accent1"/>
+          </a:fillRef>
+          <a:effectRef idx="0">
+            <a:schemeClr val="accent1"/>
+          </a:effectRef>
+          <a:fontRef idx="minor">
+            <a:schemeClr val="tx1"/>
+          </a:fontRef>
+        </p:style>
+      </p:cxnSp>
+      <p:cxnSp>
+        <p:nvCxnSpPr>
+          <p:cNvPr id="34" name="Straight Arrow Connector 33">
+            <a:extLst>
+              <a:ext uri="{FF2B5EF4-FFF2-40B4-BE49-F238E27FC236}">
+                <a16:creationId xmlns:a16="http://schemas.microsoft.com/office/drawing/2014/main" id="{1839A093-49C5-D086-F703-3F7E17BA3C4F}"/>
+              </a:ext>
+            </a:extLst>
+          </p:cNvPr>
+          <p:cNvCxnSpPr>
+            <a:cxnSpLocks/>
+          </p:cNvCxnSpPr>
+          <p:nvPr/>
+        </p:nvCxnSpPr>
+        <p:spPr>
+          <a:xfrm flipV="1">
+            <a:off x="342210" y="3382364"/>
+            <a:ext cx="0" cy="165495"/>
+          </a:xfrm>
+          <a:prstGeom prst="straightConnector1">
+            <a:avLst/>
+          </a:prstGeom>
+          <a:ln w="19050">
+            <a:solidFill>
+              <a:srgbClr val="FF09A7"/>
+            </a:solidFill>
+            <a:headEnd type="triangle"/>
+            <a:tailEnd type="triangle"/>
+          </a:ln>
+        </p:spPr>
+        <p:style>
+          <a:lnRef idx="1">
+            <a:schemeClr val="accent1"/>
+          </a:lnRef>
+          <a:fillRef idx="0">
+            <a:schemeClr val="accent1"/>
+          </a:fillRef>
+          <a:effectRef idx="0">
+            <a:schemeClr val="accent1"/>
+          </a:effectRef>
+          <a:fontRef idx="minor">
+            <a:schemeClr val="tx1"/>
+          </a:fontRef>
+        </p:style>
+      </p:cxnSp>
+      <p:sp>
+        <p:nvSpPr>
+          <p:cNvPr id="39" name="TextBox 38">
+            <a:extLst>
+              <a:ext uri="{FF2B5EF4-FFF2-40B4-BE49-F238E27FC236}">
+                <a16:creationId xmlns:a16="http://schemas.microsoft.com/office/drawing/2014/main" id="{FBD26C5A-22EF-3711-B783-694FE57DFFC9}"/>
+              </a:ext>
+            </a:extLst>
+          </p:cNvPr>
+          <p:cNvSpPr txBox="1"/>
+          <p:nvPr/>
+        </p:nvSpPr>
+        <p:spPr>
+          <a:xfrm rot="16200000">
+            <a:off x="-547693" y="3044576"/>
+            <a:ext cx="1502806" cy="276999"/>
+          </a:xfrm>
+          <a:prstGeom prst="rect">
+            <a:avLst/>
+          </a:prstGeom>
+          <a:noFill/>
+        </p:spPr>
+        <p:txBody>
+          <a:bodyPr wrap="square" rtlCol="0">
+            <a:spAutoFit/>
+          </a:bodyPr>
+          <a:lstStyle/>
+          <a:p>
+            <a:r>
+              <a:rPr lang="en-US" sz="1200" dirty="0" err="1">
+                <a:solidFill>
+                  <a:srgbClr val="FF99FF"/>
+                </a:solidFill>
+              </a:rPr>
+              <a:t>v_padding</a:t>
+            </a:r>
+            <a:endParaRPr lang="en-US" sz="1200" dirty="0">
+              <a:solidFill>
+                <a:srgbClr val="FF99FF"/>
+              </a:solidFill>
+            </a:endParaRPr>
+          </a:p>
+        </p:txBody>
+      </p:sp>
+      <p:cxnSp>
+        <p:nvCxnSpPr>
+          <p:cNvPr id="40" name="Straight Connector 39">
+            <a:extLst>
+              <a:ext uri="{FF2B5EF4-FFF2-40B4-BE49-F238E27FC236}">
+                <a16:creationId xmlns:a16="http://schemas.microsoft.com/office/drawing/2014/main" id="{F05A9801-1EFC-A9B9-FFF6-873DDA6E9D3A}"/>
+              </a:ext>
+            </a:extLst>
+          </p:cNvPr>
+          <p:cNvCxnSpPr>
+            <a:cxnSpLocks/>
+          </p:cNvCxnSpPr>
+          <p:nvPr/>
+        </p:nvCxnSpPr>
+        <p:spPr>
+          <a:xfrm>
+            <a:off x="728768" y="4109757"/>
+            <a:ext cx="626957" cy="0"/>
+          </a:xfrm>
+          <a:prstGeom prst="line">
+            <a:avLst/>
+          </a:prstGeom>
+          <a:ln w="9525">
+            <a:solidFill>
+              <a:srgbClr val="FF09A7"/>
+            </a:solidFill>
+          </a:ln>
+        </p:spPr>
+        <p:style>
+          <a:lnRef idx="1">
+            <a:schemeClr val="accent1"/>
+          </a:lnRef>
+          <a:fillRef idx="0">
+            <a:schemeClr val="accent1"/>
+          </a:fillRef>
+          <a:effectRef idx="0">
+            <a:schemeClr val="accent1"/>
+          </a:effectRef>
+          <a:fontRef idx="minor">
+            <a:schemeClr val="tx1"/>
+          </a:fontRef>
+        </p:style>
+      </p:cxnSp>
+      <p:cxnSp>
+        <p:nvCxnSpPr>
+          <p:cNvPr id="41" name="Straight Connector 40">
+            <a:extLst>
+              <a:ext uri="{FF2B5EF4-FFF2-40B4-BE49-F238E27FC236}">
+                <a16:creationId xmlns:a16="http://schemas.microsoft.com/office/drawing/2014/main" id="{2FE80E85-6101-2F5F-25BB-3662D92E9643}"/>
+              </a:ext>
+            </a:extLst>
+          </p:cNvPr>
+          <p:cNvCxnSpPr>
+            <a:cxnSpLocks/>
+          </p:cNvCxnSpPr>
+          <p:nvPr/>
+        </p:nvCxnSpPr>
+        <p:spPr>
+          <a:xfrm>
+            <a:off x="728768" y="3770109"/>
+            <a:ext cx="735399" cy="0"/>
+          </a:xfrm>
+          <a:prstGeom prst="line">
+            <a:avLst/>
+          </a:prstGeom>
+          <a:ln w="9525">
+            <a:solidFill>
+              <a:srgbClr val="FF09A7"/>
+            </a:solidFill>
+          </a:ln>
+        </p:spPr>
+        <p:style>
+          <a:lnRef idx="1">
+            <a:schemeClr val="accent1"/>
+          </a:lnRef>
+          <a:fillRef idx="0">
+            <a:schemeClr val="accent1"/>
+          </a:fillRef>
+          <a:effectRef idx="0">
+            <a:schemeClr val="accent1"/>
+          </a:effectRef>
+          <a:fontRef idx="minor">
+            <a:schemeClr val="tx1"/>
+          </a:fontRef>
+        </p:style>
+      </p:cxnSp>
+      <p:cxnSp>
+        <p:nvCxnSpPr>
+          <p:cNvPr id="43" name="Straight Arrow Connector 42">
+            <a:extLst>
+              <a:ext uri="{FF2B5EF4-FFF2-40B4-BE49-F238E27FC236}">
+                <a16:creationId xmlns:a16="http://schemas.microsoft.com/office/drawing/2014/main" id="{950AB8F1-3B72-4E29-B4AA-20A8CD965A89}"/>
+              </a:ext>
+            </a:extLst>
+          </p:cNvPr>
+          <p:cNvCxnSpPr>
+            <a:cxnSpLocks/>
+          </p:cNvCxnSpPr>
+          <p:nvPr/>
+        </p:nvCxnSpPr>
+        <p:spPr>
+          <a:xfrm flipV="1">
+            <a:off x="728768" y="3759200"/>
+            <a:ext cx="0" cy="350557"/>
+          </a:xfrm>
+          <a:prstGeom prst="straightConnector1">
+            <a:avLst/>
+          </a:prstGeom>
+          <a:ln w="19050">
+            <a:solidFill>
+              <a:srgbClr val="FF09A7"/>
+            </a:solidFill>
+            <a:headEnd type="triangle"/>
+            <a:tailEnd type="triangle"/>
+          </a:ln>
+        </p:spPr>
+        <p:style>
+          <a:lnRef idx="1">
+            <a:schemeClr val="accent1"/>
+          </a:lnRef>
+          <a:fillRef idx="0">
+            <a:schemeClr val="accent1"/>
+          </a:fillRef>
+          <a:effectRef idx="0">
+            <a:schemeClr val="accent1"/>
+          </a:effectRef>
+          <a:fontRef idx="minor">
+            <a:schemeClr val="tx1"/>
+          </a:fontRef>
+        </p:style>
+      </p:cxnSp>
+      <p:sp>
+        <p:nvSpPr>
+          <p:cNvPr id="45" name="TextBox 44">
+            <a:extLst>
+              <a:ext uri="{FF2B5EF4-FFF2-40B4-BE49-F238E27FC236}">
+                <a16:creationId xmlns:a16="http://schemas.microsoft.com/office/drawing/2014/main" id="{AB20041F-9C82-8AD2-221D-EBB997E24E57}"/>
+              </a:ext>
+            </a:extLst>
+          </p:cNvPr>
+          <p:cNvSpPr txBox="1"/>
+          <p:nvPr/>
+        </p:nvSpPr>
+        <p:spPr>
+          <a:xfrm rot="16200000">
+            <a:off x="130531" y="3789670"/>
+            <a:ext cx="937455" cy="276999"/>
+          </a:xfrm>
+          <a:prstGeom prst="rect">
+            <a:avLst/>
+          </a:prstGeom>
+          <a:noFill/>
+        </p:spPr>
+        <p:txBody>
+          <a:bodyPr wrap="square" rtlCol="0">
+            <a:spAutoFit/>
+          </a:bodyPr>
+          <a:lstStyle/>
+          <a:p>
+            <a:r>
+              <a:rPr lang="en-US" sz="1200" dirty="0" err="1">
+                <a:solidFill>
+                  <a:srgbClr val="FF99FF"/>
+                </a:solidFill>
+              </a:rPr>
+              <a:t>paddle_gap</a:t>
+            </a:r>
+            <a:endParaRPr lang="en-US" sz="1200" dirty="0">
+              <a:solidFill>
+                <a:srgbClr val="FF99FF"/>
+              </a:solidFill>
+            </a:endParaRPr>
+          </a:p>
+        </p:txBody>
+      </p:sp>
+    </p:spTree>
+    <p:extLst>
+      <p:ext uri="{BB962C8B-B14F-4D97-AF65-F5344CB8AC3E}">
+        <p14:creationId xmlns:p14="http://schemas.microsoft.com/office/powerpoint/2010/main" val="2375725415"/>
+      </p:ext>
+    </p:extLst>
+  </p:cSld>
+  <p:clrMapOvr>
+    <a:masterClrMapping/>
+  </p:clrMapOvr>
+</p:sld>
+</file>
+
+<file path=ppt/slides/slide7.xml><?xml version="1.0" encoding="utf-8"?>
+<p:sld xmlns:a="http://schemas.openxmlformats.org/drawingml/2006/main" xmlns:r="http://schemas.openxmlformats.org/officeDocument/2006/relationships" xmlns:p="http://schemas.openxmlformats.org/presentationml/2006/main">
+  <p:cSld>
+    <p:spTree>
+      <p:nvGrpSpPr>
+        <p:cNvPr id="1" name=""/>
+        <p:cNvGrpSpPr/>
+        <p:nvPr/>
+      </p:nvGrpSpPr>
+      <p:grpSpPr>
+        <a:xfrm>
+          <a:off x="0" y="0"/>
+          <a:ext cx="0" cy="0"/>
+          <a:chOff x="0" y="0"/>
+          <a:chExt cx="0" cy="0"/>
+        </a:xfrm>
+      </p:grpSpPr>
+      <p:sp>
+        <p:nvSpPr>
+          <p:cNvPr id="2" name="Title 1">
+            <a:extLst>
+              <a:ext uri="{FF2B5EF4-FFF2-40B4-BE49-F238E27FC236}">
+                <a16:creationId xmlns:a16="http://schemas.microsoft.com/office/drawing/2014/main" id="{151BC5C1-52B8-F219-489A-3C1C44E1CEBD}"/>
+              </a:ext>
+            </a:extLst>
+          </p:cNvPr>
+          <p:cNvSpPr>
+            <a:spLocks noGrp="1"/>
+          </p:cNvSpPr>
+          <p:nvPr>
+            <p:ph type="title"/>
+          </p:nvPr>
+        </p:nvSpPr>
+        <p:spPr/>
+        <p:txBody>
+          <a:bodyPr/>
+          <a:lstStyle/>
+          <a:p>
+            <a:r>
+              <a:rPr lang="en-US" dirty="0" err="1"/>
+              <a:t>SawtoothQubit</a:t>
+            </a:r>
+            <a:r>
+              <a:rPr lang="en-US" dirty="0"/>
+              <a:t> - 2</a:t>
+            </a:r>
+          </a:p>
+        </p:txBody>
+      </p:sp>
+      <p:pic>
+        <p:nvPicPr>
+          <p:cNvPr id="5" name="Content Placeholder 4" descr="A picture containing text, night sky&#10;&#10;Description automatically generated">
+            <a:extLst>
+              <a:ext uri="{FF2B5EF4-FFF2-40B4-BE49-F238E27FC236}">
+                <a16:creationId xmlns:a16="http://schemas.microsoft.com/office/drawing/2014/main" id="{73584527-1A1E-760B-0271-DD0B46C0439B}"/>
+              </a:ext>
+            </a:extLst>
+          </p:cNvPr>
+          <p:cNvPicPr>
+            <a:picLocks noGrp="1" noChangeAspect="1"/>
+          </p:cNvPicPr>
+          <p:nvPr>
+            <p:ph idx="1"/>
+          </p:nvPr>
+        </p:nvPicPr>
+        <p:blipFill rotWithShape="1">
+          <a:blip r:embed="rId2">
+            <a:extLst>
+              <a:ext uri="{28A0092B-C50C-407E-A947-70E740481C1C}">
+                <a14:useLocalDpi xmlns:a14="http://schemas.microsoft.com/office/drawing/2010/main" val="0"/>
+              </a:ext>
+            </a:extLst>
+          </a:blip>
+          <a:srcRect l="130" t="2605" r="8298" b="36683"/>
+          <a:stretch/>
+        </p:blipFill>
+        <p:spPr>
+          <a:xfrm>
+            <a:off x="293613" y="1690688"/>
+            <a:ext cx="9722841" cy="4676556"/>
+          </a:xfrm>
+        </p:spPr>
+      </p:pic>
+      <p:cxnSp>
+        <p:nvCxnSpPr>
+          <p:cNvPr id="8" name="Straight Arrow Connector 7">
+            <a:extLst>
+              <a:ext uri="{FF2B5EF4-FFF2-40B4-BE49-F238E27FC236}">
+                <a16:creationId xmlns:a16="http://schemas.microsoft.com/office/drawing/2014/main" id="{4A17C94A-0FFE-675D-391C-2E49FC84DCD3}"/>
+              </a:ext>
+            </a:extLst>
+          </p:cNvPr>
+          <p:cNvCxnSpPr>
+            <a:cxnSpLocks/>
+          </p:cNvCxnSpPr>
+          <p:nvPr/>
+        </p:nvCxnSpPr>
+        <p:spPr>
+          <a:xfrm>
+            <a:off x="738697" y="3903093"/>
+            <a:ext cx="461453" cy="0"/>
+          </a:xfrm>
+          <a:prstGeom prst="straightConnector1">
+            <a:avLst/>
+          </a:prstGeom>
+          <a:ln w="19050">
+            <a:solidFill>
+              <a:srgbClr val="FF09A7"/>
+            </a:solidFill>
+            <a:headEnd type="triangle"/>
+            <a:tailEnd type="triangle"/>
+          </a:ln>
+        </p:spPr>
+        <p:style>
+          <a:lnRef idx="1">
+            <a:schemeClr val="accent1"/>
+          </a:lnRef>
+          <a:fillRef idx="0">
+            <a:schemeClr val="accent1"/>
+          </a:fillRef>
+          <a:effectRef idx="0">
+            <a:schemeClr val="accent1"/>
+          </a:effectRef>
+          <a:fontRef idx="minor">
+            <a:schemeClr val="tx1"/>
+          </a:fontRef>
+        </p:style>
+      </p:cxnSp>
+      <p:cxnSp>
+        <p:nvCxnSpPr>
+          <p:cNvPr id="10" name="Straight Connector 9">
+            <a:extLst>
+              <a:ext uri="{FF2B5EF4-FFF2-40B4-BE49-F238E27FC236}">
+                <a16:creationId xmlns:a16="http://schemas.microsoft.com/office/drawing/2014/main" id="{99591AED-4F57-55F5-4827-C94E00D11660}"/>
+              </a:ext>
+            </a:extLst>
+          </p:cNvPr>
+          <p:cNvCxnSpPr>
+            <a:cxnSpLocks/>
+          </p:cNvCxnSpPr>
+          <p:nvPr/>
+        </p:nvCxnSpPr>
+        <p:spPr>
+          <a:xfrm>
+            <a:off x="4464785" y="3356067"/>
+            <a:ext cx="262790" cy="0"/>
+          </a:xfrm>
+          <a:prstGeom prst="line">
+            <a:avLst/>
+          </a:prstGeom>
+          <a:ln w="9525">
+            <a:solidFill>
+              <a:srgbClr val="FF09A7"/>
+            </a:solidFill>
+          </a:ln>
+        </p:spPr>
+        <p:style>
+          <a:lnRef idx="1">
+            <a:schemeClr val="accent1"/>
+          </a:lnRef>
+          <a:fillRef idx="0">
+            <a:schemeClr val="accent1"/>
+          </a:fillRef>
+          <a:effectRef idx="0">
+            <a:schemeClr val="accent1"/>
+          </a:effectRef>
+          <a:fontRef idx="minor">
+            <a:schemeClr val="tx1"/>
+          </a:fontRef>
+        </p:style>
+      </p:cxnSp>
+      <p:sp>
+        <p:nvSpPr>
+          <p:cNvPr id="14" name="TextBox 13">
+            <a:extLst>
+              <a:ext uri="{FF2B5EF4-FFF2-40B4-BE49-F238E27FC236}">
+                <a16:creationId xmlns:a16="http://schemas.microsoft.com/office/drawing/2014/main" id="{1D0FE940-F7E0-3B4F-7403-CC75B39B043D}"/>
+              </a:ext>
+            </a:extLst>
+          </p:cNvPr>
+          <p:cNvSpPr txBox="1"/>
+          <p:nvPr/>
+        </p:nvSpPr>
+        <p:spPr>
+          <a:xfrm>
+            <a:off x="524903" y="3557547"/>
+            <a:ext cx="1502806" cy="276999"/>
+          </a:xfrm>
+          <a:prstGeom prst="rect">
+            <a:avLst/>
+          </a:prstGeom>
+          <a:noFill/>
+        </p:spPr>
+        <p:txBody>
+          <a:bodyPr wrap="square" rtlCol="0">
+            <a:spAutoFit/>
+          </a:bodyPr>
+          <a:lstStyle/>
+          <a:p>
+            <a:r>
+              <a:rPr lang="en-US" sz="1200" dirty="0" err="1">
+                <a:solidFill>
+                  <a:srgbClr val="FF99FF"/>
+                </a:solidFill>
+              </a:rPr>
+              <a:t>tooth_width</a:t>
+            </a:r>
+            <a:endParaRPr lang="en-US" sz="1200" dirty="0">
+              <a:solidFill>
+                <a:srgbClr val="FF99FF"/>
+              </a:solidFill>
+            </a:endParaRPr>
+          </a:p>
+        </p:txBody>
+      </p:sp>
+      <p:cxnSp>
+        <p:nvCxnSpPr>
+          <p:cNvPr id="15" name="Straight Arrow Connector 14">
+            <a:extLst>
+              <a:ext uri="{FF2B5EF4-FFF2-40B4-BE49-F238E27FC236}">
+                <a16:creationId xmlns:a16="http://schemas.microsoft.com/office/drawing/2014/main" id="{8BCEC469-2040-5FD7-E9F9-E95B9C44F00D}"/>
+              </a:ext>
+            </a:extLst>
+          </p:cNvPr>
+          <p:cNvCxnSpPr>
+            <a:cxnSpLocks/>
+          </p:cNvCxnSpPr>
+          <p:nvPr/>
+        </p:nvCxnSpPr>
+        <p:spPr>
+          <a:xfrm>
+            <a:off x="2117695" y="4674618"/>
+            <a:ext cx="461453" cy="0"/>
+          </a:xfrm>
+          <a:prstGeom prst="straightConnector1">
+            <a:avLst/>
+          </a:prstGeom>
+          <a:ln w="19050">
+            <a:solidFill>
+              <a:srgbClr val="FF09A7"/>
+            </a:solidFill>
+            <a:headEnd type="triangle"/>
+            <a:tailEnd type="triangle"/>
+          </a:ln>
+        </p:spPr>
+        <p:style>
+          <a:lnRef idx="1">
+            <a:schemeClr val="accent1"/>
+          </a:lnRef>
+          <a:fillRef idx="0">
+            <a:schemeClr val="accent1"/>
+          </a:fillRef>
+          <a:effectRef idx="0">
+            <a:schemeClr val="accent1"/>
+          </a:effectRef>
+          <a:fontRef idx="minor">
+            <a:schemeClr val="tx1"/>
+          </a:fontRef>
+        </p:style>
+      </p:cxnSp>
+      <p:sp>
+        <p:nvSpPr>
+          <p:cNvPr id="16" name="TextBox 15">
+            <a:extLst>
+              <a:ext uri="{FF2B5EF4-FFF2-40B4-BE49-F238E27FC236}">
+                <a16:creationId xmlns:a16="http://schemas.microsoft.com/office/drawing/2014/main" id="{391D8CDC-22CF-44CC-CEDA-ECD8D9E84D3E}"/>
+              </a:ext>
+            </a:extLst>
+          </p:cNvPr>
+          <p:cNvSpPr txBox="1"/>
+          <p:nvPr/>
+        </p:nvSpPr>
+        <p:spPr>
+          <a:xfrm>
+            <a:off x="2089120" y="4711944"/>
+            <a:ext cx="1502806" cy="276999"/>
+          </a:xfrm>
+          <a:prstGeom prst="rect">
+            <a:avLst/>
+          </a:prstGeom>
+          <a:noFill/>
+        </p:spPr>
+        <p:txBody>
+          <a:bodyPr wrap="square" rtlCol="0">
+            <a:spAutoFit/>
+          </a:bodyPr>
+          <a:lstStyle/>
+          <a:p>
+            <a:r>
+              <a:rPr lang="en-US" sz="1200" dirty="0" err="1">
+                <a:solidFill>
+                  <a:srgbClr val="FF99FF"/>
+                </a:solidFill>
+              </a:rPr>
+              <a:t>tooth_spacing</a:t>
+            </a:r>
+            <a:endParaRPr lang="en-US" sz="1200" dirty="0">
+              <a:solidFill>
+                <a:srgbClr val="FF99FF"/>
+              </a:solidFill>
+            </a:endParaRPr>
+          </a:p>
+        </p:txBody>
+      </p:sp>
+      <p:cxnSp>
+        <p:nvCxnSpPr>
+          <p:cNvPr id="17" name="Straight Arrow Connector 16">
+            <a:extLst>
+              <a:ext uri="{FF2B5EF4-FFF2-40B4-BE49-F238E27FC236}">
+                <a16:creationId xmlns:a16="http://schemas.microsoft.com/office/drawing/2014/main" id="{7FEA5788-F7AB-02FA-9DA5-D1E4FC2E9A3D}"/>
+              </a:ext>
+            </a:extLst>
+          </p:cNvPr>
+          <p:cNvCxnSpPr>
+            <a:cxnSpLocks/>
+          </p:cNvCxnSpPr>
+          <p:nvPr/>
+        </p:nvCxnSpPr>
+        <p:spPr>
+          <a:xfrm>
+            <a:off x="1714500" y="4276725"/>
+            <a:ext cx="0" cy="942975"/>
+          </a:xfrm>
+          <a:prstGeom prst="straightConnector1">
+            <a:avLst/>
+          </a:prstGeom>
+          <a:ln w="19050">
+            <a:solidFill>
+              <a:srgbClr val="FF09A7"/>
+            </a:solidFill>
+            <a:headEnd type="triangle"/>
+            <a:tailEnd type="triangle"/>
+          </a:ln>
+        </p:spPr>
+        <p:style>
+          <a:lnRef idx="1">
+            <a:schemeClr val="accent1"/>
+          </a:lnRef>
+          <a:fillRef idx="0">
+            <a:schemeClr val="accent1"/>
+          </a:fillRef>
+          <a:effectRef idx="0">
+            <a:schemeClr val="accent1"/>
+          </a:effectRef>
+          <a:fontRef idx="minor">
+            <a:schemeClr val="tx1"/>
+          </a:fontRef>
+        </p:style>
+      </p:cxnSp>
+      <p:sp>
+        <p:nvSpPr>
+          <p:cNvPr id="24" name="TextBox 23">
+            <a:extLst>
+              <a:ext uri="{FF2B5EF4-FFF2-40B4-BE49-F238E27FC236}">
+                <a16:creationId xmlns:a16="http://schemas.microsoft.com/office/drawing/2014/main" id="{9B78D930-F5A4-A276-F5A3-DC8E82CA8B67}"/>
+              </a:ext>
+            </a:extLst>
+          </p:cNvPr>
+          <p:cNvSpPr txBox="1"/>
+          <p:nvPr/>
+        </p:nvSpPr>
+        <p:spPr>
+          <a:xfrm rot="16200000">
+            <a:off x="1067668" y="4329797"/>
+            <a:ext cx="1502806" cy="276999"/>
+          </a:xfrm>
+          <a:prstGeom prst="rect">
+            <a:avLst/>
+          </a:prstGeom>
+          <a:noFill/>
+        </p:spPr>
+        <p:txBody>
+          <a:bodyPr wrap="square" rtlCol="0">
+            <a:spAutoFit/>
+          </a:bodyPr>
+          <a:lstStyle/>
+          <a:p>
+            <a:r>
+              <a:rPr lang="en-US" sz="1200" dirty="0" err="1">
+                <a:solidFill>
+                  <a:srgbClr val="FF99FF"/>
+                </a:solidFill>
+              </a:rPr>
+              <a:t>tooth_height</a:t>
+            </a:r>
+            <a:endParaRPr lang="en-US" sz="1200" dirty="0">
+              <a:solidFill>
+                <a:srgbClr val="FF99FF"/>
+              </a:solidFill>
+            </a:endParaRPr>
+          </a:p>
+        </p:txBody>
+      </p:sp>
+      <p:cxnSp>
+        <p:nvCxnSpPr>
+          <p:cNvPr id="25" name="Straight Arrow Connector 24">
+            <a:extLst>
+              <a:ext uri="{FF2B5EF4-FFF2-40B4-BE49-F238E27FC236}">
+                <a16:creationId xmlns:a16="http://schemas.microsoft.com/office/drawing/2014/main" id="{29C053EA-8DBF-18C5-5967-50F39DC1D0C5}"/>
+              </a:ext>
+            </a:extLst>
+          </p:cNvPr>
+          <p:cNvCxnSpPr>
+            <a:cxnSpLocks/>
+          </p:cNvCxnSpPr>
+          <p:nvPr/>
+        </p:nvCxnSpPr>
+        <p:spPr>
+          <a:xfrm>
+            <a:off x="5862456" y="2891571"/>
+            <a:ext cx="0" cy="942975"/>
+          </a:xfrm>
+          <a:prstGeom prst="straightConnector1">
+            <a:avLst/>
+          </a:prstGeom>
+          <a:ln w="19050">
+            <a:solidFill>
+              <a:srgbClr val="FF09A7"/>
+            </a:solidFill>
+            <a:headEnd type="triangle"/>
+            <a:tailEnd type="triangle"/>
+          </a:ln>
+        </p:spPr>
+        <p:style>
+          <a:lnRef idx="1">
+            <a:schemeClr val="accent1"/>
+          </a:lnRef>
+          <a:fillRef idx="0">
+            <a:schemeClr val="accent1"/>
+          </a:fillRef>
+          <a:effectRef idx="0">
+            <a:schemeClr val="accent1"/>
+          </a:effectRef>
+          <a:fontRef idx="minor">
+            <a:schemeClr val="tx1"/>
+          </a:fontRef>
+        </p:style>
+      </p:cxnSp>
+      <p:sp>
+        <p:nvSpPr>
+          <p:cNvPr id="26" name="TextBox 25">
+            <a:extLst>
+              <a:ext uri="{FF2B5EF4-FFF2-40B4-BE49-F238E27FC236}">
+                <a16:creationId xmlns:a16="http://schemas.microsoft.com/office/drawing/2014/main" id="{2A56FC0B-8C9F-AC97-1032-A1ABDCC19D40}"/>
+              </a:ext>
+            </a:extLst>
+          </p:cNvPr>
+          <p:cNvSpPr txBox="1"/>
+          <p:nvPr/>
+        </p:nvSpPr>
+        <p:spPr>
+          <a:xfrm rot="16200000">
+            <a:off x="5215624" y="2944643"/>
+            <a:ext cx="1502806" cy="276999"/>
+          </a:xfrm>
+          <a:prstGeom prst="rect">
+            <a:avLst/>
+          </a:prstGeom>
+          <a:noFill/>
+        </p:spPr>
+        <p:txBody>
+          <a:bodyPr wrap="square" rtlCol="0">
+            <a:spAutoFit/>
+          </a:bodyPr>
+          <a:lstStyle/>
+          <a:p>
+            <a:r>
+              <a:rPr lang="en-US" sz="1200" dirty="0" err="1">
+                <a:solidFill>
+                  <a:srgbClr val="FF99FF"/>
+                </a:solidFill>
+              </a:rPr>
+              <a:t>paddle_width</a:t>
+            </a:r>
+            <a:endParaRPr lang="en-US" sz="1200" dirty="0">
+              <a:solidFill>
+                <a:srgbClr val="FF99FF"/>
+              </a:solidFill>
+            </a:endParaRPr>
+          </a:p>
+        </p:txBody>
+      </p:sp>
+      <p:cxnSp>
+        <p:nvCxnSpPr>
+          <p:cNvPr id="27" name="Straight Arrow Connector 26">
+            <a:extLst>
+              <a:ext uri="{FF2B5EF4-FFF2-40B4-BE49-F238E27FC236}">
+                <a16:creationId xmlns:a16="http://schemas.microsoft.com/office/drawing/2014/main" id="{0F028EDA-2BD4-8E9D-BE18-065EB7CA4542}"/>
+              </a:ext>
+            </a:extLst>
+          </p:cNvPr>
+          <p:cNvCxnSpPr>
+            <a:cxnSpLocks/>
+          </p:cNvCxnSpPr>
+          <p:nvPr/>
+        </p:nvCxnSpPr>
+        <p:spPr>
+          <a:xfrm>
+            <a:off x="4058396" y="5971923"/>
+            <a:ext cx="1785756" cy="0"/>
+          </a:xfrm>
+          <a:prstGeom prst="straightConnector1">
+            <a:avLst/>
+          </a:prstGeom>
+          <a:ln w="19050">
+            <a:solidFill>
+              <a:srgbClr val="FF09A7"/>
+            </a:solidFill>
+            <a:headEnd type="triangle"/>
+            <a:tailEnd type="triangle"/>
+          </a:ln>
+        </p:spPr>
+        <p:style>
+          <a:lnRef idx="1">
+            <a:schemeClr val="accent1"/>
+          </a:lnRef>
+          <a:fillRef idx="0">
+            <a:schemeClr val="accent1"/>
+          </a:fillRef>
+          <a:effectRef idx="0">
+            <a:schemeClr val="accent1"/>
+          </a:effectRef>
+          <a:fontRef idx="minor">
+            <a:schemeClr val="tx1"/>
+          </a:fontRef>
+        </p:style>
+      </p:cxnSp>
+      <p:sp>
+        <p:nvSpPr>
+          <p:cNvPr id="28" name="TextBox 27">
+            <a:extLst>
+              <a:ext uri="{FF2B5EF4-FFF2-40B4-BE49-F238E27FC236}">
+                <a16:creationId xmlns:a16="http://schemas.microsoft.com/office/drawing/2014/main" id="{952A8841-9E7F-F8A5-E30A-C60E9D5ED397}"/>
+              </a:ext>
+            </a:extLst>
+          </p:cNvPr>
+          <p:cNvSpPr txBox="1"/>
+          <p:nvPr/>
+        </p:nvSpPr>
+        <p:spPr>
+          <a:xfrm>
+            <a:off x="4341346" y="5692003"/>
+            <a:ext cx="1502806" cy="276999"/>
+          </a:xfrm>
+          <a:prstGeom prst="rect">
+            <a:avLst/>
+          </a:prstGeom>
+          <a:noFill/>
+        </p:spPr>
+        <p:txBody>
+          <a:bodyPr wrap="square" rtlCol="0">
+            <a:spAutoFit/>
+          </a:bodyPr>
+          <a:lstStyle/>
+          <a:p>
+            <a:r>
+              <a:rPr lang="en-US" sz="1200" dirty="0">
+                <a:solidFill>
+                  <a:srgbClr val="FF99FF"/>
+                </a:solidFill>
+              </a:rPr>
+              <a:t>buffer (roughly)</a:t>
+            </a:r>
+          </a:p>
+        </p:txBody>
+      </p:sp>
+      <p:cxnSp>
+        <p:nvCxnSpPr>
+          <p:cNvPr id="31" name="Straight Arrow Connector 30">
+            <a:extLst>
+              <a:ext uri="{FF2B5EF4-FFF2-40B4-BE49-F238E27FC236}">
+                <a16:creationId xmlns:a16="http://schemas.microsoft.com/office/drawing/2014/main" id="{5DF9D29B-A8DC-6A08-2454-7E2FE7C06481}"/>
+              </a:ext>
+            </a:extLst>
+          </p:cNvPr>
+          <p:cNvCxnSpPr>
+            <a:cxnSpLocks/>
+          </p:cNvCxnSpPr>
+          <p:nvPr/>
+        </p:nvCxnSpPr>
+        <p:spPr>
+          <a:xfrm>
+            <a:off x="5382699" y="5219700"/>
+            <a:ext cx="472001" cy="0"/>
+          </a:xfrm>
+          <a:prstGeom prst="straightConnector1">
+            <a:avLst/>
+          </a:prstGeom>
+          <a:ln w="19050">
+            <a:solidFill>
+              <a:srgbClr val="FF09A7"/>
+            </a:solidFill>
+            <a:headEnd type="triangle"/>
+            <a:tailEnd type="triangle"/>
+          </a:ln>
+        </p:spPr>
+        <p:style>
+          <a:lnRef idx="1">
+            <a:schemeClr val="accent1"/>
+          </a:lnRef>
+          <a:fillRef idx="0">
+            <a:schemeClr val="accent1"/>
+          </a:fillRef>
+          <a:effectRef idx="0">
+            <a:schemeClr val="accent1"/>
+          </a:effectRef>
+          <a:fontRef idx="minor">
+            <a:schemeClr val="tx1"/>
+          </a:fontRef>
+        </p:style>
+      </p:cxnSp>
+      <p:sp>
+        <p:nvSpPr>
+          <p:cNvPr id="32" name="TextBox 31">
+            <a:extLst>
+              <a:ext uri="{FF2B5EF4-FFF2-40B4-BE49-F238E27FC236}">
+                <a16:creationId xmlns:a16="http://schemas.microsoft.com/office/drawing/2014/main" id="{16659007-4E0C-A682-93C3-DE9378A0B318}"/>
+              </a:ext>
+            </a:extLst>
+          </p:cNvPr>
+          <p:cNvSpPr txBox="1"/>
+          <p:nvPr/>
+        </p:nvSpPr>
+        <p:spPr>
+          <a:xfrm>
+            <a:off x="5155033" y="4912663"/>
+            <a:ext cx="1502806" cy="276999"/>
+          </a:xfrm>
+          <a:prstGeom prst="rect">
+            <a:avLst/>
+          </a:prstGeom>
+          <a:noFill/>
+        </p:spPr>
+        <p:txBody>
+          <a:bodyPr wrap="square" rtlCol="0">
+            <a:spAutoFit/>
+          </a:bodyPr>
+          <a:lstStyle/>
+          <a:p>
+            <a:r>
+              <a:rPr lang="en-US" sz="1200" dirty="0" err="1">
+                <a:solidFill>
+                  <a:srgbClr val="FF99FF"/>
+                </a:solidFill>
+              </a:rPr>
+              <a:t>pocket_offset</a:t>
+            </a:r>
+            <a:endParaRPr lang="en-US" sz="1200" dirty="0">
+              <a:solidFill>
+                <a:srgbClr val="FF99FF"/>
+              </a:solidFill>
+            </a:endParaRPr>
+          </a:p>
+        </p:txBody>
+      </p:sp>
+      <p:cxnSp>
+        <p:nvCxnSpPr>
+          <p:cNvPr id="33" name="Straight Arrow Connector 32">
+            <a:extLst>
+              <a:ext uri="{FF2B5EF4-FFF2-40B4-BE49-F238E27FC236}">
+                <a16:creationId xmlns:a16="http://schemas.microsoft.com/office/drawing/2014/main" id="{B247CA10-1EF8-E22E-57D4-4F8BA9F419B1}"/>
+              </a:ext>
+            </a:extLst>
+          </p:cNvPr>
+          <p:cNvCxnSpPr>
+            <a:cxnSpLocks/>
+          </p:cNvCxnSpPr>
+          <p:nvPr/>
+        </p:nvCxnSpPr>
+        <p:spPr>
+          <a:xfrm>
+            <a:off x="4464879" y="3356067"/>
+            <a:ext cx="0" cy="473075"/>
+          </a:xfrm>
+          <a:prstGeom prst="straightConnector1">
+            <a:avLst/>
+          </a:prstGeom>
+          <a:ln w="19050">
+            <a:solidFill>
+              <a:srgbClr val="FF09A7"/>
+            </a:solidFill>
+            <a:headEnd type="triangle"/>
+            <a:tailEnd type="triangle"/>
+          </a:ln>
+        </p:spPr>
+        <p:style>
+          <a:lnRef idx="1">
+            <a:schemeClr val="accent1"/>
+          </a:lnRef>
+          <a:fillRef idx="0">
+            <a:schemeClr val="accent1"/>
+          </a:fillRef>
+          <a:effectRef idx="0">
+            <a:schemeClr val="accent1"/>
+          </a:effectRef>
+          <a:fontRef idx="minor">
+            <a:schemeClr val="tx1"/>
+          </a:fontRef>
+        </p:style>
+      </p:cxnSp>
+      <p:sp>
+        <p:nvSpPr>
+          <p:cNvPr id="34" name="TextBox 33">
+            <a:extLst>
+              <a:ext uri="{FF2B5EF4-FFF2-40B4-BE49-F238E27FC236}">
+                <a16:creationId xmlns:a16="http://schemas.microsoft.com/office/drawing/2014/main" id="{C1270077-0FD2-E6C3-9E7E-8700E5F26583}"/>
+              </a:ext>
+            </a:extLst>
+          </p:cNvPr>
+          <p:cNvSpPr txBox="1"/>
+          <p:nvPr/>
+        </p:nvSpPr>
+        <p:spPr>
+          <a:xfrm rot="16200000">
+            <a:off x="3780352" y="3217567"/>
+            <a:ext cx="1058129" cy="276999"/>
+          </a:xfrm>
+          <a:prstGeom prst="rect">
+            <a:avLst/>
+          </a:prstGeom>
+          <a:noFill/>
+        </p:spPr>
+        <p:txBody>
+          <a:bodyPr wrap="square" rtlCol="0">
+            <a:spAutoFit/>
+          </a:bodyPr>
+          <a:lstStyle/>
+          <a:p>
+            <a:r>
+              <a:rPr lang="en-US" sz="1200" dirty="0" err="1">
+                <a:solidFill>
+                  <a:srgbClr val="FF99FF"/>
+                </a:solidFill>
+              </a:rPr>
+              <a:t>pocket_depth</a:t>
+            </a:r>
+            <a:endParaRPr lang="en-US" sz="1200" dirty="0">
+              <a:solidFill>
+                <a:srgbClr val="FF99FF"/>
+              </a:solidFill>
+            </a:endParaRPr>
+          </a:p>
+        </p:txBody>
+      </p:sp>
+      <p:cxnSp>
+        <p:nvCxnSpPr>
+          <p:cNvPr id="42" name="Straight Connector 41">
+            <a:extLst>
+              <a:ext uri="{FF2B5EF4-FFF2-40B4-BE49-F238E27FC236}">
+                <a16:creationId xmlns:a16="http://schemas.microsoft.com/office/drawing/2014/main" id="{F05602DE-6898-1B4F-5ACE-03EAD5E5070A}"/>
+              </a:ext>
+            </a:extLst>
+          </p:cNvPr>
+          <p:cNvCxnSpPr>
+            <a:cxnSpLocks/>
+          </p:cNvCxnSpPr>
+          <p:nvPr/>
+        </p:nvCxnSpPr>
+        <p:spPr>
+          <a:xfrm>
+            <a:off x="4058396" y="5219700"/>
+            <a:ext cx="0" cy="749302"/>
+          </a:xfrm>
+          <a:prstGeom prst="line">
+            <a:avLst/>
+          </a:prstGeom>
+          <a:ln w="9525">
+            <a:solidFill>
+              <a:srgbClr val="FF09A7"/>
+            </a:solidFill>
+          </a:ln>
+        </p:spPr>
+        <p:style>
+          <a:lnRef idx="1">
+            <a:schemeClr val="accent1"/>
+          </a:lnRef>
+          <a:fillRef idx="0">
+            <a:schemeClr val="accent1"/>
+          </a:fillRef>
+          <a:effectRef idx="0">
+            <a:schemeClr val="accent1"/>
+          </a:effectRef>
+          <a:fontRef idx="minor">
+            <a:schemeClr val="tx1"/>
+          </a:fontRef>
+        </p:style>
+      </p:cxnSp>
+      <p:cxnSp>
+        <p:nvCxnSpPr>
+          <p:cNvPr id="47" name="Straight Arrow Connector 46">
+            <a:extLst>
+              <a:ext uri="{FF2B5EF4-FFF2-40B4-BE49-F238E27FC236}">
+                <a16:creationId xmlns:a16="http://schemas.microsoft.com/office/drawing/2014/main" id="{0A6C5943-2D42-15CB-6292-51B461AD2364}"/>
+              </a:ext>
+            </a:extLst>
+          </p:cNvPr>
+          <p:cNvCxnSpPr>
+            <a:cxnSpLocks/>
+          </p:cNvCxnSpPr>
+          <p:nvPr/>
+        </p:nvCxnSpPr>
+        <p:spPr>
+          <a:xfrm>
+            <a:off x="4464785" y="3829142"/>
+            <a:ext cx="917914" cy="0"/>
+          </a:xfrm>
+          <a:prstGeom prst="straightConnector1">
+            <a:avLst/>
+          </a:prstGeom>
+          <a:ln w="19050">
+            <a:solidFill>
+              <a:srgbClr val="FF09A7"/>
+            </a:solidFill>
+            <a:headEnd type="triangle"/>
+            <a:tailEnd type="triangle"/>
+          </a:ln>
+        </p:spPr>
+        <p:style>
+          <a:lnRef idx="1">
+            <a:schemeClr val="accent1"/>
+          </a:lnRef>
+          <a:fillRef idx="0">
+            <a:schemeClr val="accent1"/>
+          </a:fillRef>
+          <a:effectRef idx="0">
+            <a:schemeClr val="accent1"/>
+          </a:effectRef>
+          <a:fontRef idx="minor">
+            <a:schemeClr val="tx1"/>
+          </a:fontRef>
+        </p:style>
+      </p:cxnSp>
+      <p:sp>
+        <p:nvSpPr>
+          <p:cNvPr id="48" name="TextBox 47">
+            <a:extLst>
+              <a:ext uri="{FF2B5EF4-FFF2-40B4-BE49-F238E27FC236}">
+                <a16:creationId xmlns:a16="http://schemas.microsoft.com/office/drawing/2014/main" id="{B82021D1-759F-EEFE-149D-AD84B015339D}"/>
+              </a:ext>
+            </a:extLst>
+          </p:cNvPr>
+          <p:cNvSpPr txBox="1"/>
+          <p:nvPr/>
+        </p:nvSpPr>
+        <p:spPr>
+          <a:xfrm>
+            <a:off x="4409799" y="3782183"/>
+            <a:ext cx="1502806" cy="276999"/>
+          </a:xfrm>
+          <a:prstGeom prst="rect">
+            <a:avLst/>
+          </a:prstGeom>
+          <a:noFill/>
+        </p:spPr>
+        <p:txBody>
+          <a:bodyPr wrap="square" rtlCol="0">
+            <a:spAutoFit/>
+          </a:bodyPr>
+          <a:lstStyle/>
+          <a:p>
+            <a:r>
+              <a:rPr lang="en-US" sz="1200" dirty="0" err="1">
+                <a:solidFill>
+                  <a:srgbClr val="FF99FF"/>
+                </a:solidFill>
+              </a:rPr>
+              <a:t>pocket_length</a:t>
+            </a:r>
+            <a:endParaRPr lang="en-US" sz="1200" dirty="0">
+              <a:solidFill>
+                <a:srgbClr val="FF99FF"/>
+              </a:solidFill>
+            </a:endParaRPr>
+          </a:p>
+        </p:txBody>
+      </p:sp>
+      <p:cxnSp>
+        <p:nvCxnSpPr>
+          <p:cNvPr id="50" name="Straight Connector 49">
+            <a:extLst>
+              <a:ext uri="{FF2B5EF4-FFF2-40B4-BE49-F238E27FC236}">
+                <a16:creationId xmlns:a16="http://schemas.microsoft.com/office/drawing/2014/main" id="{3E3770E4-34DF-BFCB-7557-A8824A003D5A}"/>
+              </a:ext>
+            </a:extLst>
+          </p:cNvPr>
+          <p:cNvCxnSpPr>
+            <a:cxnSpLocks/>
+          </p:cNvCxnSpPr>
+          <p:nvPr/>
+        </p:nvCxnSpPr>
+        <p:spPr>
+          <a:xfrm>
+            <a:off x="4464785" y="5219700"/>
+            <a:ext cx="262790" cy="0"/>
+          </a:xfrm>
+          <a:prstGeom prst="line">
+            <a:avLst/>
+          </a:prstGeom>
+          <a:ln w="9525">
+            <a:solidFill>
+              <a:srgbClr val="FF09A7"/>
+            </a:solidFill>
+          </a:ln>
+        </p:spPr>
+        <p:style>
+          <a:lnRef idx="1">
+            <a:schemeClr val="accent1"/>
+          </a:lnRef>
+          <a:fillRef idx="0">
+            <a:schemeClr val="accent1"/>
+          </a:fillRef>
+          <a:effectRef idx="0">
+            <a:schemeClr val="accent1"/>
+          </a:effectRef>
+          <a:fontRef idx="minor">
+            <a:schemeClr val="tx1"/>
+          </a:fontRef>
+        </p:style>
+      </p:cxnSp>
+      <p:sp>
+        <p:nvSpPr>
+          <p:cNvPr id="52" name="Arc 51">
+            <a:extLst>
+              <a:ext uri="{FF2B5EF4-FFF2-40B4-BE49-F238E27FC236}">
+                <a16:creationId xmlns:a16="http://schemas.microsoft.com/office/drawing/2014/main" id="{55B8067D-05E2-AFE5-87FF-4AD8232F4D53}"/>
+              </a:ext>
+            </a:extLst>
+          </p:cNvPr>
+          <p:cNvSpPr/>
+          <p:nvPr/>
+        </p:nvSpPr>
+        <p:spPr>
+          <a:xfrm rot="3600000">
+            <a:off x="4303017" y="5058579"/>
+            <a:ext cx="302730" cy="302730"/>
+          </a:xfrm>
+          <a:prstGeom prst="arc">
+            <a:avLst>
+              <a:gd name="adj1" fmla="val 18216814"/>
+              <a:gd name="adj2" fmla="val 0"/>
+            </a:avLst>
+          </a:prstGeom>
+          <a:ln w="9525">
+            <a:solidFill>
+              <a:srgbClr val="FF09A7"/>
+            </a:solidFill>
+          </a:ln>
+        </p:spPr>
+        <p:style>
+          <a:lnRef idx="1">
+            <a:schemeClr val="accent1"/>
+          </a:lnRef>
+          <a:fillRef idx="0">
+            <a:schemeClr val="accent1"/>
+          </a:fillRef>
+          <a:effectRef idx="0">
+            <a:schemeClr val="accent1"/>
+          </a:effectRef>
+          <a:fontRef idx="minor">
+            <a:schemeClr val="tx1"/>
+          </a:fontRef>
+        </p:style>
+        <p:txBody>
+          <a:bodyPr rtlCol="0" anchor="ctr"/>
+          <a:lstStyle/>
+          <a:p>
+            <a:pPr algn="ctr"/>
+            <a:endParaRPr lang="en-US" dirty="0"/>
+          </a:p>
+        </p:txBody>
+      </p:sp>
+      <p:sp>
+        <p:nvSpPr>
+          <p:cNvPr id="54" name="TextBox 53">
+            <a:extLst>
+              <a:ext uri="{FF2B5EF4-FFF2-40B4-BE49-F238E27FC236}">
+                <a16:creationId xmlns:a16="http://schemas.microsoft.com/office/drawing/2014/main" id="{8804EBE5-97CD-93A5-A2DD-65584AC9B767}"/>
+              </a:ext>
+            </a:extLst>
+          </p:cNvPr>
+          <p:cNvSpPr txBox="1"/>
+          <p:nvPr/>
+        </p:nvSpPr>
+        <p:spPr>
+          <a:xfrm>
+            <a:off x="5862456" y="5362954"/>
+            <a:ext cx="1502806" cy="276999"/>
+          </a:xfrm>
+          <a:prstGeom prst="rect">
+            <a:avLst/>
+          </a:prstGeom>
+          <a:noFill/>
+        </p:spPr>
+        <p:txBody>
+          <a:bodyPr wrap="square" rtlCol="0">
+            <a:spAutoFit/>
+          </a:bodyPr>
+          <a:lstStyle/>
+          <a:p>
+            <a:r>
+              <a:rPr lang="en-US" sz="1200" dirty="0" err="1">
+                <a:solidFill>
+                  <a:srgbClr val="FF99FF"/>
+                </a:solidFill>
+              </a:rPr>
+              <a:t>pocket_wall_angle</a:t>
+            </a:r>
+            <a:endParaRPr lang="en-US" sz="1200" dirty="0">
+              <a:solidFill>
+                <a:srgbClr val="FF99FF"/>
+              </a:solidFill>
+            </a:endParaRPr>
+          </a:p>
+        </p:txBody>
+      </p:sp>
+      <p:cxnSp>
+        <p:nvCxnSpPr>
+          <p:cNvPr id="55" name="Straight Connector 54">
+            <a:extLst>
+              <a:ext uri="{FF2B5EF4-FFF2-40B4-BE49-F238E27FC236}">
+                <a16:creationId xmlns:a16="http://schemas.microsoft.com/office/drawing/2014/main" id="{261913A4-25B6-E697-27B6-191EDD0BF4BF}"/>
+              </a:ext>
+            </a:extLst>
+          </p:cNvPr>
+          <p:cNvCxnSpPr>
+            <a:cxnSpLocks/>
+          </p:cNvCxnSpPr>
+          <p:nvPr/>
+        </p:nvCxnSpPr>
+        <p:spPr>
+          <a:xfrm>
+            <a:off x="4596180" y="5299167"/>
+            <a:ext cx="1333133" cy="225333"/>
+          </a:xfrm>
+          <a:prstGeom prst="line">
+            <a:avLst/>
+          </a:prstGeom>
+          <a:ln w="9525">
+            <a:solidFill>
+              <a:srgbClr val="FF09A7"/>
+            </a:solidFill>
+          </a:ln>
+        </p:spPr>
+        <p:style>
+          <a:lnRef idx="1">
+            <a:schemeClr val="accent1"/>
+          </a:lnRef>
+          <a:fillRef idx="0">
+            <a:schemeClr val="accent1"/>
+          </a:fillRef>
+          <a:effectRef idx="0">
+            <a:schemeClr val="accent1"/>
+          </a:effectRef>
+          <a:fontRef idx="minor">
+            <a:schemeClr val="tx1"/>
+          </a:fontRef>
+        </p:style>
+      </p:cxnSp>
+    </p:spTree>
+    <p:extLst>
+      <p:ext uri="{BB962C8B-B14F-4D97-AF65-F5344CB8AC3E}">
+        <p14:creationId xmlns:p14="http://schemas.microsoft.com/office/powerpoint/2010/main" val="2382867076"/>
       </p:ext>
     </p:extLst>
   </p:cSld>

</xml_diff>

<commit_message>
transition from sdxf to ezdxf
mostly one-line changes, except in mask.py
</commit_message>
<xml_diff>
--- a/docs/ComponentDocs.pptx
+++ b/docs/ComponentDocs.pptx
@@ -10,8 +10,9 @@
     <p:sldId id="258" r:id="rId4"/>
     <p:sldId id="259" r:id="rId5"/>
     <p:sldId id="260" r:id="rId6"/>
-    <p:sldId id="261" r:id="rId7"/>
-    <p:sldId id="262" r:id="rId8"/>
+    <p:sldId id="263" r:id="rId7"/>
+    <p:sldId id="261" r:id="rId8"/>
+    <p:sldId id="262" r:id="rId9"/>
   </p:sldIdLst>
   <p:sldSz cx="12192000" cy="6858000"/>
   <p:notesSz cx="6858000" cy="9144000"/>
@@ -265,7 +266,7 @@
           <a:p>
             <a:fld id="{ACB15FA1-C85B-48BC-AF8B-E9DF226D558D}" type="datetimeFigureOut">
               <a:rPr lang="en-US" smtClean="0"/>
-              <a:t>1/18/2023</a:t>
+              <a:t>1/19/2023</a:t>
             </a:fld>
             <a:endParaRPr lang="en-US"/>
           </a:p>
@@ -463,7 +464,7 @@
           <a:p>
             <a:fld id="{ACB15FA1-C85B-48BC-AF8B-E9DF226D558D}" type="datetimeFigureOut">
               <a:rPr lang="en-US" smtClean="0"/>
-              <a:t>1/18/2023</a:t>
+              <a:t>1/19/2023</a:t>
             </a:fld>
             <a:endParaRPr lang="en-US"/>
           </a:p>
@@ -671,7 +672,7 @@
           <a:p>
             <a:fld id="{ACB15FA1-C85B-48BC-AF8B-E9DF226D558D}" type="datetimeFigureOut">
               <a:rPr lang="en-US" smtClean="0"/>
-              <a:t>1/18/2023</a:t>
+              <a:t>1/19/2023</a:t>
             </a:fld>
             <a:endParaRPr lang="en-US"/>
           </a:p>
@@ -869,7 +870,7 @@
           <a:p>
             <a:fld id="{ACB15FA1-C85B-48BC-AF8B-E9DF226D558D}" type="datetimeFigureOut">
               <a:rPr lang="en-US" smtClean="0"/>
-              <a:t>1/18/2023</a:t>
+              <a:t>1/19/2023</a:t>
             </a:fld>
             <a:endParaRPr lang="en-US"/>
           </a:p>
@@ -1144,7 +1145,7 @@
           <a:p>
             <a:fld id="{ACB15FA1-C85B-48BC-AF8B-E9DF226D558D}" type="datetimeFigureOut">
               <a:rPr lang="en-US" smtClean="0"/>
-              <a:t>1/18/2023</a:t>
+              <a:t>1/19/2023</a:t>
             </a:fld>
             <a:endParaRPr lang="en-US"/>
           </a:p>
@@ -1409,7 +1410,7 @@
           <a:p>
             <a:fld id="{ACB15FA1-C85B-48BC-AF8B-E9DF226D558D}" type="datetimeFigureOut">
               <a:rPr lang="en-US" smtClean="0"/>
-              <a:t>1/18/2023</a:t>
+              <a:t>1/19/2023</a:t>
             </a:fld>
             <a:endParaRPr lang="en-US"/>
           </a:p>
@@ -1821,7 +1822,7 @@
           <a:p>
             <a:fld id="{ACB15FA1-C85B-48BC-AF8B-E9DF226D558D}" type="datetimeFigureOut">
               <a:rPr lang="en-US" smtClean="0"/>
-              <a:t>1/18/2023</a:t>
+              <a:t>1/19/2023</a:t>
             </a:fld>
             <a:endParaRPr lang="en-US"/>
           </a:p>
@@ -1962,7 +1963,7 @@
           <a:p>
             <a:fld id="{ACB15FA1-C85B-48BC-AF8B-E9DF226D558D}" type="datetimeFigureOut">
               <a:rPr lang="en-US" smtClean="0"/>
-              <a:t>1/18/2023</a:t>
+              <a:t>1/19/2023</a:t>
             </a:fld>
             <a:endParaRPr lang="en-US"/>
           </a:p>
@@ -2075,7 +2076,7 @@
           <a:p>
             <a:fld id="{ACB15FA1-C85B-48BC-AF8B-E9DF226D558D}" type="datetimeFigureOut">
               <a:rPr lang="en-US" smtClean="0"/>
-              <a:t>1/18/2023</a:t>
+              <a:t>1/19/2023</a:t>
             </a:fld>
             <a:endParaRPr lang="en-US"/>
           </a:p>
@@ -2386,7 +2387,7 @@
           <a:p>
             <a:fld id="{ACB15FA1-C85B-48BC-AF8B-E9DF226D558D}" type="datetimeFigureOut">
               <a:rPr lang="en-US" smtClean="0"/>
-              <a:t>1/18/2023</a:t>
+              <a:t>1/19/2023</a:t>
             </a:fld>
             <a:endParaRPr lang="en-US"/>
           </a:p>
@@ -2674,7 +2675,7 @@
           <a:p>
             <a:fld id="{ACB15FA1-C85B-48BC-AF8B-E9DF226D558D}" type="datetimeFigureOut">
               <a:rPr lang="en-US" smtClean="0"/>
-              <a:t>1/18/2023</a:t>
+              <a:t>1/19/2023</a:t>
             </a:fld>
             <a:endParaRPr lang="en-US"/>
           </a:p>
@@ -2915,7 +2916,7 @@
           <a:p>
             <a:fld id="{ACB15FA1-C85B-48BC-AF8B-E9DF226D558D}" type="datetimeFigureOut">
               <a:rPr lang="en-US" smtClean="0"/>
-              <a:t>1/18/2023</a:t>
+              <a:t>1/19/2023</a:t>
             </a:fld>
             <a:endParaRPr lang="en-US"/>
           </a:p>
@@ -9482,6 +9483,882 @@
           <p:cNvPr id="2" name="Title 1">
             <a:extLst>
               <a:ext uri="{FF2B5EF4-FFF2-40B4-BE49-F238E27FC236}">
+                <a16:creationId xmlns:a16="http://schemas.microsoft.com/office/drawing/2014/main" id="{E5DF18A1-F3D6-0E63-623E-AA0590A7EBCC}"/>
+              </a:ext>
+            </a:extLst>
+          </p:cNvPr>
+          <p:cNvSpPr>
+            <a:spLocks noGrp="1"/>
+          </p:cNvSpPr>
+          <p:nvPr>
+            <p:ph type="title"/>
+          </p:nvPr>
+        </p:nvSpPr>
+        <p:spPr/>
+        <p:txBody>
+          <a:bodyPr/>
+          <a:lstStyle/>
+          <a:p>
+            <a:r>
+              <a:rPr lang="en-US" dirty="0" err="1"/>
+              <a:t>CustomQubit</a:t>
+            </a:r>
+            <a:endParaRPr lang="en-US" dirty="0"/>
+          </a:p>
+        </p:txBody>
+      </p:sp>
+      <p:pic>
+        <p:nvPicPr>
+          <p:cNvPr id="5" name="Content Placeholder 4">
+            <a:extLst>
+              <a:ext uri="{FF2B5EF4-FFF2-40B4-BE49-F238E27FC236}">
+                <a16:creationId xmlns:a16="http://schemas.microsoft.com/office/drawing/2014/main" id="{A3983154-E0A8-3C26-FCBD-7A757879B372}"/>
+              </a:ext>
+            </a:extLst>
+          </p:cNvPr>
+          <p:cNvPicPr>
+            <a:picLocks noGrp="1" noChangeAspect="1"/>
+          </p:cNvPicPr>
+          <p:nvPr>
+            <p:ph idx="1"/>
+          </p:nvPr>
+        </p:nvPicPr>
+        <p:blipFill rotWithShape="1">
+          <a:blip r:embed="rId2"/>
+          <a:srcRect t="10619"/>
+          <a:stretch/>
+        </p:blipFill>
+        <p:spPr>
+          <a:xfrm>
+            <a:off x="453606" y="1908401"/>
+            <a:ext cx="11284788" cy="3891507"/>
+          </a:xfrm>
+        </p:spPr>
+      </p:pic>
+      <p:cxnSp>
+        <p:nvCxnSpPr>
+          <p:cNvPr id="6" name="Straight Arrow Connector 5">
+            <a:extLst>
+              <a:ext uri="{FF2B5EF4-FFF2-40B4-BE49-F238E27FC236}">
+                <a16:creationId xmlns:a16="http://schemas.microsoft.com/office/drawing/2014/main" id="{1C1CEE3C-768B-8280-F04F-41CEF50D4F4D}"/>
+              </a:ext>
+            </a:extLst>
+          </p:cNvPr>
+          <p:cNvCxnSpPr>
+            <a:cxnSpLocks/>
+          </p:cNvCxnSpPr>
+          <p:nvPr/>
+        </p:nvCxnSpPr>
+        <p:spPr>
+          <a:xfrm>
+            <a:off x="10104573" y="3483429"/>
+            <a:ext cx="0" cy="1129225"/>
+          </a:xfrm>
+          <a:prstGeom prst="straightConnector1">
+            <a:avLst/>
+          </a:prstGeom>
+          <a:ln w="19050">
+            <a:solidFill>
+              <a:srgbClr val="FF09A7"/>
+            </a:solidFill>
+            <a:headEnd type="triangle"/>
+            <a:tailEnd type="triangle"/>
+          </a:ln>
+        </p:spPr>
+        <p:style>
+          <a:lnRef idx="1">
+            <a:schemeClr val="accent1"/>
+          </a:lnRef>
+          <a:fillRef idx="0">
+            <a:schemeClr val="accent1"/>
+          </a:fillRef>
+          <a:effectRef idx="0">
+            <a:schemeClr val="accent1"/>
+          </a:effectRef>
+          <a:fontRef idx="minor">
+            <a:schemeClr val="tx1"/>
+          </a:fontRef>
+        </p:style>
+      </p:cxnSp>
+      <p:sp>
+        <p:nvSpPr>
+          <p:cNvPr id="7" name="TextBox 6">
+            <a:extLst>
+              <a:ext uri="{FF2B5EF4-FFF2-40B4-BE49-F238E27FC236}">
+                <a16:creationId xmlns:a16="http://schemas.microsoft.com/office/drawing/2014/main" id="{BA7CC2BC-A015-03CB-E483-760DDF4B41D7}"/>
+              </a:ext>
+            </a:extLst>
+          </p:cNvPr>
+          <p:cNvSpPr txBox="1"/>
+          <p:nvPr/>
+        </p:nvSpPr>
+        <p:spPr>
+          <a:xfrm>
+            <a:off x="10057559" y="3933158"/>
+            <a:ext cx="1514986" cy="276999"/>
+          </a:xfrm>
+          <a:prstGeom prst="rect">
+            <a:avLst/>
+          </a:prstGeom>
+          <a:noFill/>
+        </p:spPr>
+        <p:txBody>
+          <a:bodyPr wrap="square" rtlCol="0">
+            <a:spAutoFit/>
+          </a:bodyPr>
+          <a:lstStyle/>
+          <a:p>
+            <a:r>
+              <a:rPr lang="en-US" sz="1200" dirty="0">
+                <a:solidFill>
+                  <a:srgbClr val="FF99FF"/>
+                </a:solidFill>
+              </a:rPr>
+              <a:t>height</a:t>
+            </a:r>
+          </a:p>
+        </p:txBody>
+      </p:sp>
+      <p:sp>
+        <p:nvSpPr>
+          <p:cNvPr id="9" name="Arc 8">
+            <a:extLst>
+              <a:ext uri="{FF2B5EF4-FFF2-40B4-BE49-F238E27FC236}">
+                <a16:creationId xmlns:a16="http://schemas.microsoft.com/office/drawing/2014/main" id="{63834A5D-E55A-E3B4-BCB7-DF30604CA7E6}"/>
+              </a:ext>
+            </a:extLst>
+          </p:cNvPr>
+          <p:cNvSpPr/>
+          <p:nvPr/>
+        </p:nvSpPr>
+        <p:spPr>
+          <a:xfrm>
+            <a:off x="902326" y="4268683"/>
+            <a:ext cx="622181" cy="649138"/>
+          </a:xfrm>
+          <a:prstGeom prst="arc">
+            <a:avLst>
+              <a:gd name="adj1" fmla="val 18216814"/>
+              <a:gd name="adj2" fmla="val 0"/>
+            </a:avLst>
+          </a:prstGeom>
+          <a:ln w="9525">
+            <a:solidFill>
+              <a:srgbClr val="FF09A7"/>
+            </a:solidFill>
+          </a:ln>
+        </p:spPr>
+        <p:style>
+          <a:lnRef idx="1">
+            <a:schemeClr val="accent1"/>
+          </a:lnRef>
+          <a:fillRef idx="0">
+            <a:schemeClr val="accent1"/>
+          </a:fillRef>
+          <a:effectRef idx="0">
+            <a:schemeClr val="accent1"/>
+          </a:effectRef>
+          <a:fontRef idx="minor">
+            <a:schemeClr val="tx1"/>
+          </a:fontRef>
+        </p:style>
+        <p:txBody>
+          <a:bodyPr rtlCol="0" anchor="ctr"/>
+          <a:lstStyle/>
+          <a:p>
+            <a:pPr algn="ctr"/>
+            <a:endParaRPr lang="en-US" dirty="0"/>
+          </a:p>
+        </p:txBody>
+      </p:sp>
+      <p:sp>
+        <p:nvSpPr>
+          <p:cNvPr id="10" name="TextBox 9">
+            <a:extLst>
+              <a:ext uri="{FF2B5EF4-FFF2-40B4-BE49-F238E27FC236}">
+                <a16:creationId xmlns:a16="http://schemas.microsoft.com/office/drawing/2014/main" id="{A0A96E5F-367F-BFE8-ED6E-288C45AFA909}"/>
+              </a:ext>
+            </a:extLst>
+          </p:cNvPr>
+          <p:cNvSpPr txBox="1"/>
+          <p:nvPr/>
+        </p:nvSpPr>
+        <p:spPr>
+          <a:xfrm>
+            <a:off x="1428143" y="4233348"/>
+            <a:ext cx="1514986" cy="276999"/>
+          </a:xfrm>
+          <a:prstGeom prst="rect">
+            <a:avLst/>
+          </a:prstGeom>
+          <a:noFill/>
+        </p:spPr>
+        <p:txBody>
+          <a:bodyPr wrap="square" rtlCol="0">
+            <a:spAutoFit/>
+          </a:bodyPr>
+          <a:lstStyle/>
+          <a:p>
+            <a:r>
+              <a:rPr lang="en-US" sz="1200" dirty="0" err="1">
+                <a:solidFill>
+                  <a:srgbClr val="FF99FF"/>
+                </a:solidFill>
+              </a:rPr>
+              <a:t>taper_angle</a:t>
+            </a:r>
+            <a:endParaRPr lang="en-US" sz="1200" dirty="0">
+              <a:solidFill>
+                <a:srgbClr val="FF99FF"/>
+              </a:solidFill>
+            </a:endParaRPr>
+          </a:p>
+        </p:txBody>
+      </p:sp>
+      <p:cxnSp>
+        <p:nvCxnSpPr>
+          <p:cNvPr id="13" name="Straight Connector 12">
+            <a:extLst>
+              <a:ext uri="{FF2B5EF4-FFF2-40B4-BE49-F238E27FC236}">
+                <a16:creationId xmlns:a16="http://schemas.microsoft.com/office/drawing/2014/main" id="{C05D3764-F36D-7275-8105-450ACBFC0D4C}"/>
+              </a:ext>
+            </a:extLst>
+          </p:cNvPr>
+          <p:cNvCxnSpPr>
+            <a:cxnSpLocks/>
+          </p:cNvCxnSpPr>
+          <p:nvPr/>
+        </p:nvCxnSpPr>
+        <p:spPr>
+          <a:xfrm>
+            <a:off x="924753" y="2577737"/>
+            <a:ext cx="0" cy="2026004"/>
+          </a:xfrm>
+          <a:prstGeom prst="line">
+            <a:avLst/>
+          </a:prstGeom>
+          <a:ln w="9525">
+            <a:solidFill>
+              <a:srgbClr val="FF09A7"/>
+            </a:solidFill>
+          </a:ln>
+        </p:spPr>
+        <p:style>
+          <a:lnRef idx="1">
+            <a:schemeClr val="accent1"/>
+          </a:lnRef>
+          <a:fillRef idx="0">
+            <a:schemeClr val="accent1"/>
+          </a:fillRef>
+          <a:effectRef idx="0">
+            <a:schemeClr val="accent1"/>
+          </a:effectRef>
+          <a:fontRef idx="minor">
+            <a:schemeClr val="tx1"/>
+          </a:fontRef>
+        </p:style>
+      </p:cxnSp>
+      <p:cxnSp>
+        <p:nvCxnSpPr>
+          <p:cNvPr id="14" name="Straight Arrow Connector 13">
+            <a:extLst>
+              <a:ext uri="{FF2B5EF4-FFF2-40B4-BE49-F238E27FC236}">
+                <a16:creationId xmlns:a16="http://schemas.microsoft.com/office/drawing/2014/main" id="{DA4237C5-3683-933A-C83D-98ABFE18DA91}"/>
+              </a:ext>
+            </a:extLst>
+          </p:cNvPr>
+          <p:cNvCxnSpPr>
+            <a:cxnSpLocks/>
+          </p:cNvCxnSpPr>
+          <p:nvPr/>
+        </p:nvCxnSpPr>
+        <p:spPr>
+          <a:xfrm>
+            <a:off x="924753" y="2577737"/>
+            <a:ext cx="280308" cy="0"/>
+          </a:xfrm>
+          <a:prstGeom prst="straightConnector1">
+            <a:avLst/>
+          </a:prstGeom>
+          <a:ln w="19050">
+            <a:solidFill>
+              <a:srgbClr val="FF09A7"/>
+            </a:solidFill>
+            <a:headEnd type="triangle"/>
+            <a:tailEnd type="triangle"/>
+          </a:ln>
+        </p:spPr>
+        <p:style>
+          <a:lnRef idx="1">
+            <a:schemeClr val="accent1"/>
+          </a:lnRef>
+          <a:fillRef idx="0">
+            <a:schemeClr val="accent1"/>
+          </a:fillRef>
+          <a:effectRef idx="0">
+            <a:schemeClr val="accent1"/>
+          </a:effectRef>
+          <a:fontRef idx="minor">
+            <a:schemeClr val="tx1"/>
+          </a:fontRef>
+        </p:style>
+      </p:cxnSp>
+      <p:sp>
+        <p:nvSpPr>
+          <p:cNvPr id="15" name="TextBox 14">
+            <a:extLst>
+              <a:ext uri="{FF2B5EF4-FFF2-40B4-BE49-F238E27FC236}">
+                <a16:creationId xmlns:a16="http://schemas.microsoft.com/office/drawing/2014/main" id="{579B6210-0C2E-7942-D7A2-887DADB39A37}"/>
+              </a:ext>
+            </a:extLst>
+          </p:cNvPr>
+          <p:cNvSpPr txBox="1"/>
+          <p:nvPr/>
+        </p:nvSpPr>
+        <p:spPr>
+          <a:xfrm>
+            <a:off x="801465" y="2302183"/>
+            <a:ext cx="1502806" cy="276999"/>
+          </a:xfrm>
+          <a:prstGeom prst="rect">
+            <a:avLst/>
+          </a:prstGeom>
+          <a:noFill/>
+        </p:spPr>
+        <p:txBody>
+          <a:bodyPr wrap="square" rtlCol="0">
+            <a:spAutoFit/>
+          </a:bodyPr>
+          <a:lstStyle/>
+          <a:p>
+            <a:r>
+              <a:rPr lang="en-US" sz="1200" dirty="0">
+                <a:solidFill>
+                  <a:srgbClr val="FF99FF"/>
+                </a:solidFill>
+              </a:rPr>
+              <a:t>offset</a:t>
+            </a:r>
+          </a:p>
+        </p:txBody>
+      </p:sp>
+      <p:cxnSp>
+        <p:nvCxnSpPr>
+          <p:cNvPr id="22" name="Straight Connector 21">
+            <a:extLst>
+              <a:ext uri="{FF2B5EF4-FFF2-40B4-BE49-F238E27FC236}">
+                <a16:creationId xmlns:a16="http://schemas.microsoft.com/office/drawing/2014/main" id="{F82B2381-41D9-8AA8-2008-FD3E86A001D7}"/>
+              </a:ext>
+            </a:extLst>
+          </p:cNvPr>
+          <p:cNvCxnSpPr>
+            <a:cxnSpLocks/>
+          </p:cNvCxnSpPr>
+          <p:nvPr/>
+        </p:nvCxnSpPr>
+        <p:spPr>
+          <a:xfrm>
+            <a:off x="1205061" y="2586650"/>
+            <a:ext cx="0" cy="2026004"/>
+          </a:xfrm>
+          <a:prstGeom prst="line">
+            <a:avLst/>
+          </a:prstGeom>
+          <a:ln w="9525">
+            <a:solidFill>
+              <a:srgbClr val="FF09A7"/>
+            </a:solidFill>
+          </a:ln>
+        </p:spPr>
+        <p:style>
+          <a:lnRef idx="1">
+            <a:schemeClr val="accent1"/>
+          </a:lnRef>
+          <a:fillRef idx="0">
+            <a:schemeClr val="accent1"/>
+          </a:fillRef>
+          <a:effectRef idx="0">
+            <a:schemeClr val="accent1"/>
+          </a:effectRef>
+          <a:fontRef idx="minor">
+            <a:schemeClr val="tx1"/>
+          </a:fontRef>
+        </p:style>
+      </p:cxnSp>
+      <p:cxnSp>
+        <p:nvCxnSpPr>
+          <p:cNvPr id="24" name="Straight Connector 23">
+            <a:extLst>
+              <a:ext uri="{FF2B5EF4-FFF2-40B4-BE49-F238E27FC236}">
+                <a16:creationId xmlns:a16="http://schemas.microsoft.com/office/drawing/2014/main" id="{56DB7CAD-19D6-BC29-C9CD-87FB812CED17}"/>
+              </a:ext>
+            </a:extLst>
+          </p:cNvPr>
+          <p:cNvCxnSpPr>
+            <a:cxnSpLocks/>
+          </p:cNvCxnSpPr>
+          <p:nvPr/>
+        </p:nvCxnSpPr>
+        <p:spPr>
+          <a:xfrm>
+            <a:off x="11088201" y="2586650"/>
+            <a:ext cx="0" cy="2026004"/>
+          </a:xfrm>
+          <a:prstGeom prst="line">
+            <a:avLst/>
+          </a:prstGeom>
+          <a:ln w="9525">
+            <a:solidFill>
+              <a:srgbClr val="FF09A7"/>
+            </a:solidFill>
+          </a:ln>
+        </p:spPr>
+        <p:style>
+          <a:lnRef idx="1">
+            <a:schemeClr val="accent1"/>
+          </a:lnRef>
+          <a:fillRef idx="0">
+            <a:schemeClr val="accent1"/>
+          </a:fillRef>
+          <a:effectRef idx="0">
+            <a:schemeClr val="accent1"/>
+          </a:effectRef>
+          <a:fontRef idx="minor">
+            <a:schemeClr val="tx1"/>
+          </a:fontRef>
+        </p:style>
+      </p:cxnSp>
+      <p:cxnSp>
+        <p:nvCxnSpPr>
+          <p:cNvPr id="25" name="Straight Arrow Connector 24">
+            <a:extLst>
+              <a:ext uri="{FF2B5EF4-FFF2-40B4-BE49-F238E27FC236}">
+                <a16:creationId xmlns:a16="http://schemas.microsoft.com/office/drawing/2014/main" id="{CF3F2E93-A3EC-A3E6-56F6-F42505868620}"/>
+              </a:ext>
+            </a:extLst>
+          </p:cNvPr>
+          <p:cNvCxnSpPr>
+            <a:cxnSpLocks/>
+          </p:cNvCxnSpPr>
+          <p:nvPr/>
+        </p:nvCxnSpPr>
+        <p:spPr>
+          <a:xfrm>
+            <a:off x="1205061" y="2577737"/>
+            <a:ext cx="9883140" cy="0"/>
+          </a:xfrm>
+          <a:prstGeom prst="straightConnector1">
+            <a:avLst/>
+          </a:prstGeom>
+          <a:ln w="19050">
+            <a:solidFill>
+              <a:srgbClr val="FF09A7"/>
+            </a:solidFill>
+            <a:headEnd type="triangle"/>
+            <a:tailEnd type="triangle"/>
+          </a:ln>
+        </p:spPr>
+        <p:style>
+          <a:lnRef idx="1">
+            <a:schemeClr val="accent1"/>
+          </a:lnRef>
+          <a:fillRef idx="0">
+            <a:schemeClr val="accent1"/>
+          </a:fillRef>
+          <a:effectRef idx="0">
+            <a:schemeClr val="accent1"/>
+          </a:effectRef>
+          <a:fontRef idx="minor">
+            <a:schemeClr val="tx1"/>
+          </a:fontRef>
+        </p:style>
+      </p:cxnSp>
+      <p:sp>
+        <p:nvSpPr>
+          <p:cNvPr id="28" name="TextBox 27">
+            <a:extLst>
+              <a:ext uri="{FF2B5EF4-FFF2-40B4-BE49-F238E27FC236}">
+                <a16:creationId xmlns:a16="http://schemas.microsoft.com/office/drawing/2014/main" id="{0A90C881-ADF7-D097-AEEF-70F2323A1F46}"/>
+              </a:ext>
+            </a:extLst>
+          </p:cNvPr>
+          <p:cNvSpPr txBox="1"/>
+          <p:nvPr/>
+        </p:nvSpPr>
+        <p:spPr>
+          <a:xfrm>
+            <a:off x="5807805" y="2302183"/>
+            <a:ext cx="1502806" cy="276999"/>
+          </a:xfrm>
+          <a:prstGeom prst="rect">
+            <a:avLst/>
+          </a:prstGeom>
+          <a:noFill/>
+        </p:spPr>
+        <p:txBody>
+          <a:bodyPr wrap="square" rtlCol="0">
+            <a:spAutoFit/>
+          </a:bodyPr>
+          <a:lstStyle/>
+          <a:p>
+            <a:r>
+              <a:rPr lang="en-US" sz="1200" dirty="0">
+                <a:solidFill>
+                  <a:srgbClr val="FF99FF"/>
+                </a:solidFill>
+              </a:rPr>
+              <a:t>length</a:t>
+            </a:r>
+          </a:p>
+        </p:txBody>
+      </p:sp>
+      <p:cxnSp>
+        <p:nvCxnSpPr>
+          <p:cNvPr id="29" name="Straight Connector 28">
+            <a:extLst>
+              <a:ext uri="{FF2B5EF4-FFF2-40B4-BE49-F238E27FC236}">
+                <a16:creationId xmlns:a16="http://schemas.microsoft.com/office/drawing/2014/main" id="{BB2EA16E-7F0A-591B-B5EF-3950CEEB1B36}"/>
+              </a:ext>
+            </a:extLst>
+          </p:cNvPr>
+          <p:cNvCxnSpPr>
+            <a:cxnSpLocks/>
+          </p:cNvCxnSpPr>
+          <p:nvPr/>
+        </p:nvCxnSpPr>
+        <p:spPr>
+          <a:xfrm>
+            <a:off x="710406" y="4612654"/>
+            <a:ext cx="861115" cy="0"/>
+          </a:xfrm>
+          <a:prstGeom prst="line">
+            <a:avLst/>
+          </a:prstGeom>
+          <a:ln w="9525">
+            <a:solidFill>
+              <a:srgbClr val="FF09A7"/>
+            </a:solidFill>
+          </a:ln>
+        </p:spPr>
+        <p:style>
+          <a:lnRef idx="1">
+            <a:schemeClr val="accent1"/>
+          </a:lnRef>
+          <a:fillRef idx="0">
+            <a:schemeClr val="accent1"/>
+          </a:fillRef>
+          <a:effectRef idx="0">
+            <a:schemeClr val="accent1"/>
+          </a:effectRef>
+          <a:fontRef idx="minor">
+            <a:schemeClr val="tx1"/>
+          </a:fontRef>
+        </p:style>
+      </p:cxnSp>
+      <p:cxnSp>
+        <p:nvCxnSpPr>
+          <p:cNvPr id="30" name="Straight Arrow Connector 29">
+            <a:extLst>
+              <a:ext uri="{FF2B5EF4-FFF2-40B4-BE49-F238E27FC236}">
+                <a16:creationId xmlns:a16="http://schemas.microsoft.com/office/drawing/2014/main" id="{DF168942-09F3-7C04-AD0C-BEB3CF1E53EB}"/>
+              </a:ext>
+            </a:extLst>
+          </p:cNvPr>
+          <p:cNvCxnSpPr>
+            <a:cxnSpLocks/>
+          </p:cNvCxnSpPr>
+          <p:nvPr/>
+        </p:nvCxnSpPr>
+        <p:spPr>
+          <a:xfrm flipV="1">
+            <a:off x="710406" y="4596461"/>
+            <a:ext cx="0" cy="137636"/>
+          </a:xfrm>
+          <a:prstGeom prst="straightConnector1">
+            <a:avLst/>
+          </a:prstGeom>
+          <a:ln w="19050">
+            <a:solidFill>
+              <a:srgbClr val="FF09A7"/>
+            </a:solidFill>
+            <a:headEnd type="triangle"/>
+            <a:tailEnd type="triangle"/>
+          </a:ln>
+        </p:spPr>
+        <p:style>
+          <a:lnRef idx="1">
+            <a:schemeClr val="accent1"/>
+          </a:lnRef>
+          <a:fillRef idx="0">
+            <a:schemeClr val="accent1"/>
+          </a:fillRef>
+          <a:effectRef idx="0">
+            <a:schemeClr val="accent1"/>
+          </a:effectRef>
+          <a:fontRef idx="minor">
+            <a:schemeClr val="tx1"/>
+          </a:fontRef>
+        </p:style>
+      </p:cxnSp>
+      <p:sp>
+        <p:nvSpPr>
+          <p:cNvPr id="31" name="TextBox 30">
+            <a:extLst>
+              <a:ext uri="{FF2B5EF4-FFF2-40B4-BE49-F238E27FC236}">
+                <a16:creationId xmlns:a16="http://schemas.microsoft.com/office/drawing/2014/main" id="{775F9E92-2793-F769-BABF-41ED2C0C8FBA}"/>
+              </a:ext>
+            </a:extLst>
+          </p:cNvPr>
+          <p:cNvSpPr txBox="1"/>
+          <p:nvPr/>
+        </p:nvSpPr>
+        <p:spPr>
+          <a:xfrm rot="16200000">
+            <a:off x="207378" y="4501558"/>
+            <a:ext cx="721764" cy="276999"/>
+          </a:xfrm>
+          <a:prstGeom prst="rect">
+            <a:avLst/>
+          </a:prstGeom>
+          <a:noFill/>
+        </p:spPr>
+        <p:txBody>
+          <a:bodyPr wrap="square" rtlCol="0">
+            <a:spAutoFit/>
+          </a:bodyPr>
+          <a:lstStyle/>
+          <a:p>
+            <a:pPr>
+              <a:tabLst>
+                <a:tab pos="628650" algn="l"/>
+              </a:tabLst>
+            </a:pPr>
+            <a:r>
+              <a:rPr lang="en-US" sz="1200" dirty="0" err="1">
+                <a:solidFill>
+                  <a:srgbClr val="FF99FF"/>
+                </a:solidFill>
+              </a:rPr>
+              <a:t>pin_gap</a:t>
+            </a:r>
+            <a:endParaRPr lang="en-US" sz="1200" dirty="0">
+              <a:solidFill>
+                <a:srgbClr val="FF99FF"/>
+              </a:solidFill>
+            </a:endParaRPr>
+          </a:p>
+        </p:txBody>
+      </p:sp>
+      <p:cxnSp>
+        <p:nvCxnSpPr>
+          <p:cNvPr id="32" name="Straight Connector 31">
+            <a:extLst>
+              <a:ext uri="{FF2B5EF4-FFF2-40B4-BE49-F238E27FC236}">
+                <a16:creationId xmlns:a16="http://schemas.microsoft.com/office/drawing/2014/main" id="{63FF8C54-EF82-6519-CDCD-862B82CDCF73}"/>
+              </a:ext>
+            </a:extLst>
+          </p:cNvPr>
+          <p:cNvCxnSpPr>
+            <a:cxnSpLocks/>
+          </p:cNvCxnSpPr>
+          <p:nvPr/>
+        </p:nvCxnSpPr>
+        <p:spPr>
+          <a:xfrm>
+            <a:off x="706760" y="4729335"/>
+            <a:ext cx="861115" cy="0"/>
+          </a:xfrm>
+          <a:prstGeom prst="line">
+            <a:avLst/>
+          </a:prstGeom>
+          <a:ln w="9525">
+            <a:solidFill>
+              <a:srgbClr val="FF09A7"/>
+            </a:solidFill>
+          </a:ln>
+        </p:spPr>
+        <p:style>
+          <a:lnRef idx="1">
+            <a:schemeClr val="accent1"/>
+          </a:lnRef>
+          <a:fillRef idx="0">
+            <a:schemeClr val="accent1"/>
+          </a:fillRef>
+          <a:effectRef idx="0">
+            <a:schemeClr val="accent1"/>
+          </a:effectRef>
+          <a:fontRef idx="minor">
+            <a:schemeClr val="tx1"/>
+          </a:fontRef>
+        </p:style>
+      </p:cxnSp>
+      <p:cxnSp>
+        <p:nvCxnSpPr>
+          <p:cNvPr id="33" name="Straight Connector 32">
+            <a:extLst>
+              <a:ext uri="{FF2B5EF4-FFF2-40B4-BE49-F238E27FC236}">
+                <a16:creationId xmlns:a16="http://schemas.microsoft.com/office/drawing/2014/main" id="{1CB7FD3E-D79C-3E72-DC67-8D973701457F}"/>
+              </a:ext>
+            </a:extLst>
+          </p:cNvPr>
+          <p:cNvCxnSpPr>
+            <a:cxnSpLocks/>
+          </p:cNvCxnSpPr>
+          <p:nvPr/>
+        </p:nvCxnSpPr>
+        <p:spPr>
+          <a:xfrm>
+            <a:off x="2279481" y="3175000"/>
+            <a:ext cx="0" cy="1437654"/>
+          </a:xfrm>
+          <a:prstGeom prst="line">
+            <a:avLst/>
+          </a:prstGeom>
+          <a:ln w="9525">
+            <a:solidFill>
+              <a:srgbClr val="FF09A7"/>
+            </a:solidFill>
+          </a:ln>
+        </p:spPr>
+        <p:style>
+          <a:lnRef idx="1">
+            <a:schemeClr val="accent1"/>
+          </a:lnRef>
+          <a:fillRef idx="0">
+            <a:schemeClr val="accent1"/>
+          </a:fillRef>
+          <a:effectRef idx="0">
+            <a:schemeClr val="accent1"/>
+          </a:effectRef>
+          <a:fontRef idx="minor">
+            <a:schemeClr val="tx1"/>
+          </a:fontRef>
+        </p:style>
+      </p:cxnSp>
+      <p:cxnSp>
+        <p:nvCxnSpPr>
+          <p:cNvPr id="35" name="Straight Arrow Connector 34">
+            <a:extLst>
+              <a:ext uri="{FF2B5EF4-FFF2-40B4-BE49-F238E27FC236}">
+                <a16:creationId xmlns:a16="http://schemas.microsoft.com/office/drawing/2014/main" id="{1B33FF8E-AE2C-C7CE-BCDC-B58345769A1E}"/>
+              </a:ext>
+            </a:extLst>
+          </p:cNvPr>
+          <p:cNvCxnSpPr>
+            <a:cxnSpLocks/>
+          </p:cNvCxnSpPr>
+          <p:nvPr/>
+        </p:nvCxnSpPr>
+        <p:spPr>
+          <a:xfrm>
+            <a:off x="1206500" y="3175000"/>
+            <a:ext cx="1072981" cy="0"/>
+          </a:xfrm>
+          <a:prstGeom prst="straightConnector1">
+            <a:avLst/>
+          </a:prstGeom>
+          <a:ln w="19050">
+            <a:solidFill>
+              <a:srgbClr val="FF09A7"/>
+            </a:solidFill>
+            <a:headEnd type="triangle"/>
+            <a:tailEnd type="triangle"/>
+          </a:ln>
+        </p:spPr>
+        <p:style>
+          <a:lnRef idx="1">
+            <a:schemeClr val="accent1"/>
+          </a:lnRef>
+          <a:fillRef idx="0">
+            <a:schemeClr val="accent1"/>
+          </a:fillRef>
+          <a:effectRef idx="0">
+            <a:schemeClr val="accent1"/>
+          </a:effectRef>
+          <a:fontRef idx="minor">
+            <a:schemeClr val="tx1"/>
+          </a:fontRef>
+        </p:style>
+      </p:cxnSp>
+      <p:sp>
+        <p:nvSpPr>
+          <p:cNvPr id="37" name="TextBox 36">
+            <a:extLst>
+              <a:ext uri="{FF2B5EF4-FFF2-40B4-BE49-F238E27FC236}">
+                <a16:creationId xmlns:a16="http://schemas.microsoft.com/office/drawing/2014/main" id="{F8E77F18-5BDE-A9A4-0426-95F88E38D9BE}"/>
+              </a:ext>
+            </a:extLst>
+          </p:cNvPr>
+          <p:cNvSpPr txBox="1"/>
+          <p:nvPr/>
+        </p:nvSpPr>
+        <p:spPr>
+          <a:xfrm>
+            <a:off x="1205056" y="2898963"/>
+            <a:ext cx="1502806" cy="276999"/>
+          </a:xfrm>
+          <a:prstGeom prst="rect">
+            <a:avLst/>
+          </a:prstGeom>
+          <a:noFill/>
+        </p:spPr>
+        <p:txBody>
+          <a:bodyPr wrap="square" rtlCol="0">
+            <a:spAutoFit/>
+          </a:bodyPr>
+          <a:lstStyle/>
+          <a:p>
+            <a:r>
+              <a:rPr lang="en-US" sz="1200" dirty="0" err="1">
+                <a:solidFill>
+                  <a:srgbClr val="FF99FF"/>
+                </a:solidFill>
+              </a:rPr>
+              <a:t>import_offset</a:t>
+            </a:r>
+            <a:endParaRPr lang="en-US" sz="1200" dirty="0">
+              <a:solidFill>
+                <a:srgbClr val="FF99FF"/>
+              </a:solidFill>
+            </a:endParaRPr>
+          </a:p>
+        </p:txBody>
+      </p:sp>
+    </p:spTree>
+    <p:extLst>
+      <p:ext uri="{BB962C8B-B14F-4D97-AF65-F5344CB8AC3E}">
+        <p14:creationId xmlns:p14="http://schemas.microsoft.com/office/powerpoint/2010/main" val="803320973"/>
+      </p:ext>
+    </p:extLst>
+  </p:cSld>
+  <p:clrMapOvr>
+    <a:masterClrMapping/>
+  </p:clrMapOvr>
+</p:sld>
+</file>
+
+<file path=ppt/slides/slide7.xml><?xml version="1.0" encoding="utf-8"?>
+<p:sld xmlns:a="http://schemas.openxmlformats.org/drawingml/2006/main" xmlns:r="http://schemas.openxmlformats.org/officeDocument/2006/relationships" xmlns:p="http://schemas.openxmlformats.org/presentationml/2006/main">
+  <p:cSld>
+    <p:spTree>
+      <p:nvGrpSpPr>
+        <p:cNvPr id="1" name=""/>
+        <p:cNvGrpSpPr/>
+        <p:nvPr/>
+      </p:nvGrpSpPr>
+      <p:grpSpPr>
+        <a:xfrm>
+          <a:off x="0" y="0"/>
+          <a:ext cx="0" cy="0"/>
+          <a:chOff x="0" y="0"/>
+          <a:chExt cx="0" cy="0"/>
+        </a:xfrm>
+      </p:grpSpPr>
+      <p:sp>
+        <p:nvSpPr>
+          <p:cNvPr id="2" name="Title 1">
+            <a:extLst>
+              <a:ext uri="{FF2B5EF4-FFF2-40B4-BE49-F238E27FC236}">
                 <a16:creationId xmlns:a16="http://schemas.microsoft.com/office/drawing/2014/main" id="{71B7646F-BD1B-E503-5535-D2313E2A5D99}"/>
               </a:ext>
             </a:extLst>
@@ -10446,7 +11323,7 @@
 </p:sld>
 </file>
 
-<file path=ppt/slides/slide7.xml><?xml version="1.0" encoding="utf-8"?>
+<file path=ppt/slides/slide8.xml><?xml version="1.0" encoding="utf-8"?>
 <p:sld xmlns:a="http://schemas.openxmlformats.org/drawingml/2006/main" xmlns:r="http://schemas.openxmlformats.org/officeDocument/2006/relationships" xmlns:p="http://schemas.openxmlformats.org/presentationml/2006/main">
   <p:cSld>
     <p:spTree>

</xml_diff>